<commit_message>
more work on project
</commit_message>
<xml_diff>
--- a/Kojack_Presentation.pptx
+++ b/Kojack_Presentation.pptx
@@ -7,10 +7,12 @@
   <p:sldIdLst>
     <p:sldId id="256" r:id="rId2"/>
     <p:sldId id="257" r:id="rId3"/>
-    <p:sldId id="260" r:id="rId4"/>
-    <p:sldId id="261" r:id="rId5"/>
-    <p:sldId id="258" r:id="rId6"/>
-    <p:sldId id="259" r:id="rId7"/>
+    <p:sldId id="263" r:id="rId4"/>
+    <p:sldId id="260" r:id="rId5"/>
+    <p:sldId id="262" r:id="rId6"/>
+    <p:sldId id="261" r:id="rId7"/>
+    <p:sldId id="258" r:id="rId8"/>
+    <p:sldId id="259" r:id="rId9"/>
   </p:sldIdLst>
   <p:sldSz cx="9144000" cy="6858000" type="screen4x3"/>
   <p:notesSz cx="6858000" cy="9144000"/>
@@ -3112,12 +3114,21 @@
         </p:nvSpPr>
         <p:spPr/>
         <p:txBody>
-          <a:bodyPr/>
-          <a:lstStyle/>
-          <a:p>
-            <a:r>
-              <a:rPr lang="en-US" dirty="0" smtClean="0"/>
-              <a:t>Using Neural Networks to Predict Financial Markets</a:t>
+          <a:bodyPr>
+            <a:normAutofit/>
+          </a:bodyPr>
+          <a:lstStyle/>
+          <a:p>
+            <a:r>
+              <a:rPr lang="en-US" dirty="0" smtClean="0"/>
+              <a:t>Predicting Markets with </a:t>
+            </a:r>
+            <a:br>
+              <a:rPr lang="en-US" dirty="0" smtClean="0"/>
+            </a:br>
+            <a:r>
+              <a:rPr lang="en-US" dirty="0" smtClean="0"/>
+              <a:t>Neural Networks</a:t>
             </a:r>
             <a:endParaRPr lang="en-US" dirty="0"/>
           </a:p>
@@ -3215,10 +3226,15 @@
             <p:ph idx="1"/>
           </p:nvPr>
         </p:nvSpPr>
-        <p:spPr/>
+        <p:spPr>
+          <a:xfrm>
+            <a:off x="457200" y="1600200"/>
+            <a:ext cx="8229600" cy="4862445"/>
+          </a:xfrm>
+        </p:spPr>
         <p:txBody>
           <a:bodyPr>
-            <a:normAutofit fontScale="92500" lnSpcReduction="10000"/>
+            <a:normAutofit fontScale="92500" lnSpcReduction="20000"/>
           </a:bodyPr>
           <a:lstStyle/>
           <a:p>
@@ -3231,7 +3247,56 @@
             <a:pPr lvl="1"/>
             <a:r>
               <a:rPr lang="en-US" dirty="0" smtClean="0"/>
-              <a:t>To predict the next day’s market direction using a set of time series data available from St. Louis Fed’s FRED database</a:t>
+              <a:t>To predict the next day’s market direction using a set of historical time series data</a:t>
+            </a:r>
+          </a:p>
+          <a:p>
+            <a:pPr lvl="1"/>
+            <a:endParaRPr lang="en-US" dirty="0" smtClean="0"/>
+          </a:p>
+          <a:p>
+            <a:pPr lvl="1"/>
+            <a:r>
+              <a:rPr lang="en-US" dirty="0" smtClean="0"/>
+              <a:t>Compare the accuracy of different neural network /deep learning structures</a:t>
+            </a:r>
+          </a:p>
+          <a:p>
+            <a:pPr lvl="1"/>
+            <a:endParaRPr lang="en-US" dirty="0"/>
+          </a:p>
+          <a:p>
+            <a:r>
+              <a:rPr lang="en-US" dirty="0" smtClean="0"/>
+              <a:t>Markets to Predict</a:t>
+            </a:r>
+          </a:p>
+          <a:p>
+            <a:pPr lvl="2"/>
+            <a:r>
+              <a:rPr lang="en-US" sz="2800" dirty="0" smtClean="0"/>
+              <a:t>S&amp;P 500</a:t>
+            </a:r>
+          </a:p>
+          <a:p>
+            <a:pPr lvl="2"/>
+            <a:r>
+              <a:rPr lang="en-US" sz="2800" dirty="0" smtClean="0"/>
+              <a:t>Gold</a:t>
+            </a:r>
+          </a:p>
+          <a:p>
+            <a:pPr lvl="2"/>
+            <a:r>
+              <a:rPr lang="en-US" sz="2800" dirty="0" smtClean="0"/>
+              <a:t>Oil</a:t>
+            </a:r>
+          </a:p>
+          <a:p>
+            <a:pPr lvl="2"/>
+            <a:r>
+              <a:rPr lang="en-US" sz="2800" dirty="0" smtClean="0"/>
+              <a:t>US Treasury Yields</a:t>
             </a:r>
           </a:p>
           <a:p>
@@ -3239,50 +3304,6 @@
               <a:buNone/>
             </a:pPr>
             <a:endParaRPr lang="en-US" dirty="0" smtClean="0"/>
-          </a:p>
-          <a:p>
-            <a:pPr marL="457200" lvl="1" indent="0">
-              <a:buNone/>
-            </a:pPr>
-            <a:endParaRPr lang="en-US" dirty="0" smtClean="0"/>
-          </a:p>
-          <a:p>
-            <a:pPr marL="457200" lvl="1" indent="0">
-              <a:buNone/>
-            </a:pPr>
-            <a:r>
-              <a:rPr lang="en-US" dirty="0" smtClean="0"/>
-              <a:t>Markets to Predict:</a:t>
-            </a:r>
-          </a:p>
-          <a:p>
-            <a:pPr lvl="2"/>
-            <a:r>
-              <a:rPr lang="en-US" dirty="0" smtClean="0"/>
-              <a:t>S&amp;P 500</a:t>
-            </a:r>
-          </a:p>
-          <a:p>
-            <a:pPr lvl="2"/>
-            <a:r>
-              <a:rPr lang="en-US" dirty="0" smtClean="0"/>
-              <a:t>Gold</a:t>
-            </a:r>
-          </a:p>
-          <a:p>
-            <a:pPr lvl="2"/>
-            <a:r>
-              <a:rPr lang="en-US" dirty="0" smtClean="0"/>
-              <a:t>Oil</a:t>
-            </a:r>
-          </a:p>
-          <a:p>
-            <a:pPr lvl="2"/>
-            <a:r>
-              <a:rPr lang="en-US" dirty="0" smtClean="0"/>
-              <a:t>US Treasury Yields</a:t>
-            </a:r>
-            <a:endParaRPr lang="en-US" dirty="0"/>
           </a:p>
         </p:txBody>
       </p:sp>
@@ -3328,12 +3349,14 @@
         </p:nvSpPr>
         <p:spPr/>
         <p:txBody>
-          <a:bodyPr/>
-          <a:lstStyle/>
-          <a:p>
-            <a:r>
-              <a:rPr lang="en-US" dirty="0" smtClean="0"/>
-              <a:t>Data</a:t>
+          <a:bodyPr>
+            <a:normAutofit fontScale="90000"/>
+          </a:bodyPr>
+          <a:lstStyle/>
+          <a:p>
+            <a:r>
+              <a:rPr lang="en-US" dirty="0" smtClean="0"/>
+              <a:t>Why hire a Robot to manage your money?</a:t>
             </a:r>
             <a:endParaRPr lang="en-US" dirty="0"/>
           </a:p>
@@ -3349,55 +3372,42 @@
             <p:ph idx="1"/>
           </p:nvPr>
         </p:nvSpPr>
-        <p:spPr>
-          <a:xfrm>
-            <a:off x="457200" y="1562844"/>
-            <a:ext cx="8229600" cy="4525963"/>
-          </a:xfrm>
-        </p:spPr>
-        <p:txBody>
-          <a:bodyPr/>
-          <a:lstStyle/>
-          <a:p>
-            <a:r>
-              <a:rPr lang="en-US" dirty="0" smtClean="0"/>
-              <a:t>~ 2,500 financial and macroeconomic time series</a:t>
-            </a:r>
-          </a:p>
-          <a:p>
-            <a:endParaRPr lang="en-US" dirty="0" smtClean="0"/>
-          </a:p>
-          <a:p>
-            <a:r>
-              <a:rPr lang="en-US" dirty="0" smtClean="0"/>
-              <a:t>Data Issues:</a:t>
+        <p:spPr/>
+        <p:txBody>
+          <a:bodyPr/>
+          <a:lstStyle/>
+          <a:p>
+            <a:r>
+              <a:rPr lang="en-US" dirty="0" smtClean="0"/>
+              <a:t>Robots are smart</a:t>
+            </a:r>
+          </a:p>
+          <a:p>
+            <a:r>
+              <a:rPr lang="en-US" dirty="0" smtClean="0"/>
+              <a:t>Robots are fast</a:t>
+            </a:r>
+          </a:p>
+          <a:p>
+            <a:r>
+              <a:rPr lang="en-US" dirty="0" smtClean="0"/>
+              <a:t>Robots are emotionless</a:t>
             </a:r>
           </a:p>
           <a:p>
             <a:pPr lvl="1"/>
             <a:r>
               <a:rPr lang="en-US" dirty="0" smtClean="0"/>
-              <a:t>Inconsistent starting dates</a:t>
-            </a:r>
-          </a:p>
-          <a:p>
-            <a:pPr lvl="1"/>
-            <a:r>
-              <a:rPr lang="en-US" dirty="0" smtClean="0"/>
-              <a:t>Inconsistent frequency </a:t>
-            </a:r>
-          </a:p>
-          <a:p>
-            <a:pPr lvl="1"/>
-            <a:r>
-              <a:rPr lang="en-US" dirty="0" smtClean="0"/>
-              <a:t>Inconsistent release day of week for weekly data</a:t>
-            </a:r>
-          </a:p>
-          <a:p>
-            <a:pPr marL="0" indent="0">
-              <a:buNone/>
-            </a:pPr>
+              <a:t>Not </a:t>
+            </a:r>
+            <a:r>
+              <a:rPr lang="en-US" dirty="0" err="1" smtClean="0"/>
+              <a:t>sceptible</a:t>
+            </a:r>
+            <a:r>
+              <a:rPr lang="en-US" dirty="0" smtClean="0"/>
+              <a:t> to human emotional flaws</a:t>
+            </a:r>
             <a:endParaRPr lang="en-US" dirty="0"/>
           </a:p>
         </p:txBody>
@@ -3405,7 +3415,7 @@
     </p:spTree>
     <p:extLst>
       <p:ext uri="{BB962C8B-B14F-4D97-AF65-F5344CB8AC3E}">
-        <p14:creationId xmlns:p14="http://schemas.microsoft.com/office/powerpoint/2010/main" val="2196208621"/>
+        <p14:creationId xmlns:p14="http://schemas.microsoft.com/office/powerpoint/2010/main" val="2174193925"/>
       </p:ext>
     </p:extLst>
   </p:cSld>
@@ -3449,7 +3459,7 @@
           <a:p>
             <a:r>
               <a:rPr lang="en-US" dirty="0" smtClean="0"/>
-              <a:t>Neural Networks Used</a:t>
+              <a:t>Data</a:t>
             </a:r>
             <a:endParaRPr lang="en-US" dirty="0"/>
           </a:p>
@@ -3465,81 +3475,124 @@
             <p:ph idx="1"/>
           </p:nvPr>
         </p:nvSpPr>
-        <p:spPr/>
+        <p:spPr>
+          <a:xfrm>
+            <a:off x="457199" y="1363612"/>
+            <a:ext cx="8420651" cy="4999418"/>
+          </a:xfrm>
+        </p:spPr>
         <p:txBody>
           <a:bodyPr>
-            <a:normAutofit lnSpcReduction="10000"/>
+            <a:noAutofit/>
           </a:bodyPr>
           <a:lstStyle/>
           <a:p>
             <a:r>
-              <a:rPr lang="en-US" dirty="0" err="1" smtClean="0"/>
-              <a:t>Feedforward</a:t>
-            </a:r>
-            <a:r>
-              <a:rPr lang="en-US" dirty="0" smtClean="0"/>
-              <a:t> Neural Networks</a:t>
+              <a:rPr lang="en-US" sz="2000" dirty="0" smtClean="0"/>
+              <a:t>~ 2,500 financial and macroeconomic time series from the St. Louis Fed’s FRED database</a:t>
+            </a:r>
+          </a:p>
+          <a:p>
+            <a:endParaRPr lang="en-US" sz="2000" dirty="0" smtClean="0"/>
+          </a:p>
+          <a:p>
+            <a:r>
+              <a:rPr lang="en-US" sz="2000" dirty="0" smtClean="0"/>
+              <a:t>Data Issues:</a:t>
             </a:r>
           </a:p>
           <a:p>
             <a:pPr lvl="1"/>
             <a:r>
-              <a:rPr lang="en-US" dirty="0" smtClean="0"/>
-              <a:t>Data only goes forward starting from input nodes to output nodes</a:t>
+              <a:rPr lang="en-US" sz="2000" dirty="0" smtClean="0"/>
+              <a:t>Inconsistent starting dates</a:t>
             </a:r>
           </a:p>
           <a:p>
             <a:pPr lvl="1"/>
-            <a:endParaRPr lang="en-US" dirty="0" smtClean="0"/>
-          </a:p>
-          <a:p>
-            <a:r>
-              <a:rPr lang="en-US" dirty="0" smtClean="0"/>
-              <a:t>Recurrent Neural Networks</a:t>
+            <a:r>
+              <a:rPr lang="en-US" sz="2000" dirty="0" smtClean="0"/>
+              <a:t>Inconsistent frequency </a:t>
             </a:r>
           </a:p>
           <a:p>
             <a:pPr lvl="1"/>
             <a:r>
-              <a:rPr lang="en-US" dirty="0" smtClean="0"/>
-              <a:t>Short Description</a:t>
+              <a:rPr lang="en-US" sz="2000" dirty="0" smtClean="0"/>
+              <a:t>Inconsistent release day of week for weekly data</a:t>
             </a:r>
           </a:p>
           <a:p>
             <a:pPr lvl="1"/>
-            <a:endParaRPr lang="en-US" dirty="0"/>
-          </a:p>
-          <a:p>
-            <a:r>
-              <a:rPr lang="en-US" dirty="0" smtClean="0"/>
-              <a:t>Convolutional Neural Networks</a:t>
+            <a:r>
+              <a:rPr lang="en-US" sz="2000" dirty="0" smtClean="0"/>
+              <a:t>Timestamps of weekly data was not date of release but last date of data coverage</a:t>
+            </a:r>
+          </a:p>
+          <a:p>
+            <a:endParaRPr lang="en-US" sz="2000" dirty="0" smtClean="0"/>
+          </a:p>
+          <a:p>
+            <a:r>
+              <a:rPr lang="en-US" sz="2000" dirty="0" smtClean="0"/>
+              <a:t>Solutions:</a:t>
             </a:r>
           </a:p>
           <a:p>
             <a:pPr lvl="1"/>
             <a:r>
-              <a:rPr lang="en-US" dirty="0" smtClean="0"/>
-              <a:t>Short Description</a:t>
+              <a:rPr lang="en-US" sz="2000" dirty="0"/>
+              <a:t>U</a:t>
+            </a:r>
+            <a:r>
+              <a:rPr lang="en-US" sz="2000" dirty="0" smtClean="0"/>
+              <a:t>sed daily data only</a:t>
             </a:r>
           </a:p>
           <a:p>
             <a:pPr lvl="1"/>
-            <a:endParaRPr lang="en-US" dirty="0" smtClean="0"/>
-          </a:p>
-          <a:p>
-            <a:pPr lvl="1"/>
-            <a:endParaRPr lang="en-US" dirty="0"/>
-          </a:p>
-          <a:p>
-            <a:pPr lvl="1"/>
-            <a:endParaRPr lang="en-US" dirty="0"/>
+            <a:r>
+              <a:rPr lang="en-US" sz="2000" dirty="0" smtClean="0"/>
+              <a:t>Cut out data prior to a start date of the feature with the latest start date</a:t>
+            </a:r>
+          </a:p>
+          <a:p>
+            <a:pPr marL="457200" lvl="1" indent="0">
+              <a:buNone/>
+            </a:pPr>
+            <a:endParaRPr lang="en-US" sz="2000" dirty="0"/>
+          </a:p>
+          <a:p>
+            <a:pPr marL="457200" lvl="1" indent="0">
+              <a:buNone/>
+            </a:pPr>
+            <a:r>
+              <a:rPr lang="en-US" sz="2000" dirty="0"/>
+              <a:t>O</a:t>
+            </a:r>
+            <a:r>
+              <a:rPr lang="en-US" sz="2000" dirty="0" smtClean="0"/>
+              <a:t>nly 500 features remained to be used</a:t>
+            </a:r>
+          </a:p>
+          <a:p>
+            <a:pPr marL="457200" lvl="1" indent="0">
+              <a:buNone/>
+            </a:pPr>
+            <a:endParaRPr lang="en-US" sz="2000" dirty="0" smtClean="0"/>
+          </a:p>
+          <a:p>
+            <a:pPr marL="0" indent="0">
+              <a:buNone/>
+            </a:pPr>
+            <a:endParaRPr lang="en-US" sz="2000" dirty="0"/>
           </a:p>
         </p:txBody>
       </p:sp>
     </p:spTree>
     <p:extLst>
       <p:ext uri="{BB962C8B-B14F-4D97-AF65-F5344CB8AC3E}">
-        <p14:creationId xmlns:p14="http://schemas.microsoft.com/office/powerpoint/2010/main" val="2014615936"/>
+        <p14:creationId xmlns:p14="http://schemas.microsoft.com/office/powerpoint/2010/main" val="2196208621"/>
       </p:ext>
     </p:extLst>
   </p:cSld>
@@ -3583,7 +3636,7 @@
           <a:p>
             <a:r>
               <a:rPr lang="en-US" dirty="0" smtClean="0"/>
-              <a:t>Accuracy Visualizations</a:t>
+              <a:t>Add to presentation</a:t>
             </a:r>
             <a:endParaRPr lang="en-US" dirty="0"/>
           </a:p>
@@ -3601,17 +3654,193 @@
         </p:nvSpPr>
         <p:spPr/>
         <p:txBody>
-          <a:bodyPr/>
-          <a:lstStyle/>
-          <a:p>
-            <a:endParaRPr lang="en-US"/>
+          <a:bodyPr>
+            <a:normAutofit fontScale="47500" lnSpcReduction="20000"/>
+          </a:bodyPr>
+          <a:lstStyle/>
+          <a:p>
+            <a:pPr marL="342900" lvl="1" indent="-342900">
+              <a:buFont typeface="Arial"/>
+              <a:buChar char="•"/>
+            </a:pPr>
+            <a:r>
+              <a:rPr lang="en-US" sz="2000" dirty="0" smtClean="0"/>
+              <a:t>Describe the process of cleaning data and getting into correct format</a:t>
+            </a:r>
+          </a:p>
+          <a:p>
+            <a:pPr marL="742950" lvl="2" indent="-342900"/>
+            <a:r>
+              <a:rPr lang="en-US" sz="1600" dirty="0" err="1" smtClean="0"/>
+              <a:t>Calc</a:t>
+            </a:r>
+            <a:r>
+              <a:rPr lang="en-US" sz="1600" dirty="0" smtClean="0"/>
+              <a:t> differences, etc.</a:t>
+            </a:r>
+          </a:p>
+          <a:p>
+            <a:pPr marL="742950" lvl="2" indent="-342900"/>
+            <a:r>
+              <a:rPr lang="en-US" sz="1600" dirty="0" smtClean="0"/>
+              <a:t>Names of software’s and why used it. GPU use. Deep learning. </a:t>
+            </a:r>
+            <a:r>
+              <a:rPr lang="en-US" sz="1600" dirty="0" smtClean="0"/>
+              <a:t>PCA, scaled data, train predict, cross validation</a:t>
+            </a:r>
+          </a:p>
+          <a:p>
+            <a:pPr marL="742950" lvl="2" indent="-342900"/>
+            <a:r>
+              <a:rPr lang="en-US" sz="1600" dirty="0" smtClean="0"/>
+              <a:t>Use </a:t>
+            </a:r>
+            <a:r>
+              <a:rPr lang="en-US" sz="1600" dirty="0" err="1" smtClean="0"/>
+              <a:t>mongodb</a:t>
+            </a:r>
+            <a:endParaRPr lang="en-US" sz="1600" dirty="0" smtClean="0"/>
+          </a:p>
+          <a:p>
+            <a:r>
+              <a:rPr lang="en-US" dirty="0" smtClean="0"/>
+              <a:t>Background on using ml for finance</a:t>
+            </a:r>
+          </a:p>
+          <a:p>
+            <a:r>
+              <a:rPr lang="en-US" dirty="0" smtClean="0"/>
+              <a:t>Why hire a robot to trading your money? </a:t>
+            </a:r>
+          </a:p>
+          <a:p>
+            <a:pPr lvl="1"/>
+            <a:r>
+              <a:rPr lang="en-US" dirty="0" smtClean="0"/>
+              <a:t>She’s smart -&gt; can digest a lot of data</a:t>
+            </a:r>
+          </a:p>
+          <a:p>
+            <a:pPr lvl="1"/>
+            <a:r>
+              <a:rPr lang="en-US" dirty="0" smtClean="0"/>
+              <a:t>She’s fast -&gt;</a:t>
+            </a:r>
+          </a:p>
+          <a:p>
+            <a:pPr lvl="1"/>
+            <a:r>
+              <a:rPr lang="en-US" dirty="0" smtClean="0"/>
+              <a:t>She’s beautiful -&gt;</a:t>
+            </a:r>
+          </a:p>
+          <a:p>
+            <a:pPr lvl="1"/>
+            <a:r>
+              <a:rPr lang="en-US" dirty="0" smtClean="0"/>
+              <a:t>She’s won’t get angry at your</a:t>
+            </a:r>
+          </a:p>
+          <a:p>
+            <a:r>
+              <a:rPr lang="en-US" dirty="0" err="1" smtClean="0"/>
+              <a:t>Heatmap</a:t>
+            </a:r>
+            <a:r>
+              <a:rPr lang="en-US" dirty="0" smtClean="0"/>
+              <a:t> of accuracy of different models</a:t>
+            </a:r>
+          </a:p>
+          <a:p>
+            <a:r>
+              <a:rPr lang="en-US" dirty="0" smtClean="0"/>
+              <a:t>Put nice background on title like </a:t>
+            </a:r>
+            <a:r>
+              <a:rPr lang="en-US" dirty="0" err="1" smtClean="0"/>
+              <a:t>alison</a:t>
+            </a:r>
+            <a:r>
+              <a:rPr lang="en-US" dirty="0" smtClean="0"/>
+              <a:t> </a:t>
+            </a:r>
+            <a:r>
+              <a:rPr lang="en-US" dirty="0" err="1" smtClean="0"/>
+              <a:t>cossette</a:t>
+            </a:r>
+            <a:endParaRPr lang="en-US" dirty="0" smtClean="0"/>
+          </a:p>
+          <a:p>
+            <a:r>
+              <a:rPr lang="en-US" dirty="0" smtClean="0"/>
+              <a:t>Add a story like automated trading will allow emotionless trading</a:t>
+            </a:r>
+          </a:p>
+          <a:p>
+            <a:r>
+              <a:rPr lang="en-US" dirty="0" smtClean="0"/>
+              <a:t>Add graphs of neural net with weights of connections</a:t>
+            </a:r>
+          </a:p>
+          <a:p>
+            <a:r>
+              <a:rPr lang="en-US" dirty="0" smtClean="0"/>
+              <a:t>Interpretation of weights?</a:t>
+            </a:r>
+          </a:p>
+          <a:p>
+            <a:r>
+              <a:rPr lang="en-US" dirty="0" smtClean="0"/>
+              <a:t>Use different activation functions</a:t>
+            </a:r>
+          </a:p>
+          <a:p>
+            <a:r>
+              <a:rPr lang="en-US" dirty="0" smtClean="0"/>
+              <a:t>Feature importance: try adding noise to each feature and see what happens to accuracy</a:t>
+            </a:r>
+          </a:p>
+          <a:p>
+            <a:r>
+              <a:rPr lang="en-US" dirty="0" smtClean="0"/>
+              <a:t>Ask </a:t>
+            </a:r>
+            <a:r>
+              <a:rPr lang="en-US" dirty="0" err="1" smtClean="0"/>
+              <a:t>harish</a:t>
+            </a:r>
+            <a:r>
+              <a:rPr lang="en-US" dirty="0" smtClean="0"/>
+              <a:t> how he did his presentation</a:t>
+            </a:r>
+          </a:p>
+          <a:p>
+            <a:r>
+              <a:rPr lang="en-US" dirty="0" smtClean="0"/>
+              <a:t>Do normal classification </a:t>
+            </a:r>
+            <a:r>
+              <a:rPr lang="en-US" dirty="0" err="1" smtClean="0"/>
+              <a:t>algos</a:t>
+            </a:r>
+            <a:r>
+              <a:rPr lang="en-US" dirty="0" smtClean="0"/>
+              <a:t> and compare</a:t>
+            </a:r>
+          </a:p>
+          <a:p>
+            <a:endParaRPr lang="en-US" dirty="0" smtClean="0"/>
+          </a:p>
+          <a:p>
+            <a:endParaRPr lang="en-US" dirty="0"/>
           </a:p>
         </p:txBody>
       </p:sp>
     </p:spTree>
     <p:extLst>
       <p:ext uri="{BB962C8B-B14F-4D97-AF65-F5344CB8AC3E}">
-        <p14:creationId xmlns:p14="http://schemas.microsoft.com/office/powerpoint/2010/main" val="2319253204"/>
+        <p14:creationId xmlns:p14="http://schemas.microsoft.com/office/powerpoint/2010/main" val="4167259632"/>
       </p:ext>
     </p:extLst>
   </p:cSld>
@@ -3653,6 +3882,10 @@
           <a:bodyPr/>
           <a:lstStyle/>
           <a:p>
+            <a:r>
+              <a:rPr lang="en-US" dirty="0" smtClean="0"/>
+              <a:t>Methodology</a:t>
+            </a:r>
             <a:endParaRPr lang="en-US" dirty="0"/>
           </a:p>
         </p:txBody>
@@ -3667,12 +3900,294 @@
             <p:ph idx="1"/>
           </p:nvPr>
         </p:nvSpPr>
-        <p:spPr/>
-        <p:txBody>
-          <a:bodyPr/>
-          <a:lstStyle/>
-          <a:p>
-            <a:endParaRPr lang="en-US"/>
+        <p:spPr>
+          <a:xfrm>
+            <a:off x="457200" y="1425872"/>
+            <a:ext cx="8229600" cy="5111486"/>
+          </a:xfrm>
+        </p:spPr>
+        <p:txBody>
+          <a:bodyPr>
+            <a:normAutofit fontScale="92500"/>
+          </a:bodyPr>
+          <a:lstStyle/>
+          <a:p>
+            <a:r>
+              <a:rPr lang="en-US" dirty="0" err="1" smtClean="0"/>
+              <a:t>Feedforward</a:t>
+            </a:r>
+            <a:r>
+              <a:rPr lang="en-US" dirty="0" smtClean="0"/>
+              <a:t> Neural Networks</a:t>
+            </a:r>
+          </a:p>
+          <a:p>
+            <a:pPr lvl="1"/>
+            <a:r>
+              <a:rPr lang="en-US" dirty="0" smtClean="0"/>
+              <a:t>Data only goes forward starting from input nodes to output nodes</a:t>
+            </a:r>
+          </a:p>
+          <a:p>
+            <a:pPr lvl="1"/>
+            <a:endParaRPr lang="en-US" dirty="0" smtClean="0"/>
+          </a:p>
+          <a:p>
+            <a:r>
+              <a:rPr lang="en-US" dirty="0" smtClean="0"/>
+              <a:t>Recurrent Neural Networks</a:t>
+            </a:r>
+          </a:p>
+          <a:p>
+            <a:pPr lvl="1"/>
+            <a:r>
+              <a:rPr lang="en-US" dirty="0" smtClean="0"/>
+              <a:t>Loops exist within the layers such that outputs can be inputs to nodes at the same layer or to prior layers</a:t>
+            </a:r>
+          </a:p>
+          <a:p>
+            <a:pPr lvl="1"/>
+            <a:r>
+              <a:rPr lang="en-US" dirty="0" smtClean="0"/>
+              <a:t>Can be thought of as a way to introduce a kind of memory into the system</a:t>
+            </a:r>
+          </a:p>
+          <a:p>
+            <a:pPr lvl="1"/>
+            <a:r>
+              <a:rPr lang="en-US" dirty="0" smtClean="0"/>
+              <a:t>Works well for sequential data such as time series and text data</a:t>
+            </a:r>
+          </a:p>
+          <a:p>
+            <a:pPr lvl="1"/>
+            <a:endParaRPr lang="en-US" dirty="0" smtClean="0"/>
+          </a:p>
+          <a:p>
+            <a:pPr lvl="1"/>
+            <a:endParaRPr lang="en-US" dirty="0" smtClean="0"/>
+          </a:p>
+          <a:p>
+            <a:pPr lvl="1"/>
+            <a:endParaRPr lang="en-US" dirty="0"/>
+          </a:p>
+          <a:p>
+            <a:pPr lvl="1"/>
+            <a:endParaRPr lang="en-US" dirty="0"/>
+          </a:p>
+        </p:txBody>
+      </p:sp>
+    </p:spTree>
+    <p:extLst>
+      <p:ext uri="{BB962C8B-B14F-4D97-AF65-F5344CB8AC3E}">
+        <p14:creationId xmlns:p14="http://schemas.microsoft.com/office/powerpoint/2010/main" val="2014615936"/>
+      </p:ext>
+    </p:extLst>
+  </p:cSld>
+  <p:clrMapOvr>
+    <a:masterClrMapping/>
+  </p:clrMapOvr>
+</p:sld>
+</file>
+
+<file path=ppt/slides/slide7.xml><?xml version="1.0" encoding="utf-8"?>
+<p:sld xmlns:a="http://schemas.openxmlformats.org/drawingml/2006/main" xmlns:r="http://schemas.openxmlformats.org/officeDocument/2006/relationships" xmlns:p="http://schemas.openxmlformats.org/presentationml/2006/main">
+  <p:cSld>
+    <p:spTree>
+      <p:nvGrpSpPr>
+        <p:cNvPr id="1" name=""/>
+        <p:cNvGrpSpPr/>
+        <p:nvPr/>
+      </p:nvGrpSpPr>
+      <p:grpSpPr>
+        <a:xfrm>
+          <a:off x="0" y="0"/>
+          <a:ext cx="0" cy="0"/>
+          <a:chOff x="0" y="0"/>
+          <a:chExt cx="0" cy="0"/>
+        </a:xfrm>
+      </p:grpSpPr>
+      <p:sp>
+        <p:nvSpPr>
+          <p:cNvPr id="2" name="Title 1"/>
+          <p:cNvSpPr>
+            <a:spLocks noGrp="1"/>
+          </p:cNvSpPr>
+          <p:nvPr>
+            <p:ph type="title"/>
+          </p:nvPr>
+        </p:nvSpPr>
+        <p:spPr/>
+        <p:txBody>
+          <a:bodyPr/>
+          <a:lstStyle/>
+          <a:p>
+            <a:r>
+              <a:rPr lang="en-US" dirty="0" smtClean="0"/>
+              <a:t>Accuracy Visualizations</a:t>
+            </a:r>
+            <a:endParaRPr lang="en-US" dirty="0"/>
+          </a:p>
+        </p:txBody>
+      </p:sp>
+      <p:sp>
+        <p:nvSpPr>
+          <p:cNvPr id="3" name="Content Placeholder 2"/>
+          <p:cNvSpPr>
+            <a:spLocks noGrp="1"/>
+          </p:cNvSpPr>
+          <p:nvPr>
+            <p:ph idx="1"/>
+          </p:nvPr>
+        </p:nvSpPr>
+        <p:spPr/>
+        <p:txBody>
+          <a:bodyPr/>
+          <a:lstStyle/>
+          <a:p>
+            <a:r>
+              <a:rPr lang="en-US" dirty="0" smtClean="0"/>
+              <a:t>Graph of Accuracy vs. various number of layers of a </a:t>
+            </a:r>
+            <a:r>
+              <a:rPr lang="en-US" dirty="0" err="1" smtClean="0"/>
+              <a:t>Feedforward</a:t>
+            </a:r>
+            <a:r>
+              <a:rPr lang="en-US" dirty="0" smtClean="0"/>
+              <a:t> Neural Net Structure</a:t>
+            </a:r>
+          </a:p>
+          <a:p>
+            <a:endParaRPr lang="en-US" dirty="0"/>
+          </a:p>
+          <a:p>
+            <a:r>
+              <a:rPr lang="en-US" dirty="0" smtClean="0"/>
+              <a:t>Graph of Accuracy vs. various number of nodes for two hidden layers</a:t>
+            </a:r>
+          </a:p>
+          <a:p>
+            <a:endParaRPr lang="en-US" dirty="0" smtClean="0"/>
+          </a:p>
+          <a:p>
+            <a:r>
+              <a:rPr lang="en-US" dirty="0"/>
+              <a:t>G</a:t>
+            </a:r>
+            <a:r>
+              <a:rPr lang="en-US" dirty="0" smtClean="0"/>
+              <a:t>raph of Accuracy for </a:t>
+            </a:r>
+            <a:r>
+              <a:rPr lang="en-US" dirty="0" err="1" smtClean="0"/>
+              <a:t>Feedforward</a:t>
+            </a:r>
+            <a:r>
+              <a:rPr lang="en-US" dirty="0"/>
+              <a:t> </a:t>
+            </a:r>
+            <a:r>
+              <a:rPr lang="en-US" dirty="0" smtClean="0"/>
+              <a:t>vs. Recurrent Neural Networks</a:t>
+            </a:r>
+            <a:endParaRPr lang="en-US" dirty="0"/>
+          </a:p>
+        </p:txBody>
+      </p:sp>
+    </p:spTree>
+    <p:extLst>
+      <p:ext uri="{BB962C8B-B14F-4D97-AF65-F5344CB8AC3E}">
+        <p14:creationId xmlns:p14="http://schemas.microsoft.com/office/powerpoint/2010/main" val="2319253204"/>
+      </p:ext>
+    </p:extLst>
+  </p:cSld>
+  <p:clrMapOvr>
+    <a:masterClrMapping/>
+  </p:clrMapOvr>
+</p:sld>
+</file>
+
+<file path=ppt/slides/slide8.xml><?xml version="1.0" encoding="utf-8"?>
+<p:sld xmlns:a="http://schemas.openxmlformats.org/drawingml/2006/main" xmlns:r="http://schemas.openxmlformats.org/officeDocument/2006/relationships" xmlns:p="http://schemas.openxmlformats.org/presentationml/2006/main">
+  <p:cSld>
+    <p:spTree>
+      <p:nvGrpSpPr>
+        <p:cNvPr id="1" name=""/>
+        <p:cNvGrpSpPr/>
+        <p:nvPr/>
+      </p:nvGrpSpPr>
+      <p:grpSpPr>
+        <a:xfrm>
+          <a:off x="0" y="0"/>
+          <a:ext cx="0" cy="0"/>
+          <a:chOff x="0" y="0"/>
+          <a:chExt cx="0" cy="0"/>
+        </a:xfrm>
+      </p:grpSpPr>
+      <p:sp>
+        <p:nvSpPr>
+          <p:cNvPr id="2" name="Title 1"/>
+          <p:cNvSpPr>
+            <a:spLocks noGrp="1"/>
+          </p:cNvSpPr>
+          <p:nvPr>
+            <p:ph type="title"/>
+          </p:nvPr>
+        </p:nvSpPr>
+        <p:spPr/>
+        <p:txBody>
+          <a:bodyPr/>
+          <a:lstStyle/>
+          <a:p>
+            <a:r>
+              <a:rPr lang="en-US" dirty="0" smtClean="0"/>
+              <a:t>Conclusion</a:t>
+            </a:r>
+            <a:endParaRPr lang="en-US" dirty="0"/>
+          </a:p>
+        </p:txBody>
+      </p:sp>
+      <p:sp>
+        <p:nvSpPr>
+          <p:cNvPr id="3" name="Content Placeholder 2"/>
+          <p:cNvSpPr>
+            <a:spLocks noGrp="1"/>
+          </p:cNvSpPr>
+          <p:nvPr>
+            <p:ph idx="1"/>
+          </p:nvPr>
+        </p:nvSpPr>
+        <p:spPr/>
+        <p:txBody>
+          <a:bodyPr/>
+          <a:lstStyle/>
+          <a:p>
+            <a:r>
+              <a:rPr lang="en-US" dirty="0" smtClean="0"/>
+              <a:t>Explain the feasibility of using neural networks to predict financial markets</a:t>
+            </a:r>
+          </a:p>
+          <a:p>
+            <a:r>
+              <a:rPr lang="en-US" dirty="0" smtClean="0"/>
+              <a:t>Explain general accuracy trends observed for various number of hidden layers and number of nodes per hidden layer</a:t>
+            </a:r>
+          </a:p>
+          <a:p>
+            <a:r>
+              <a:rPr lang="en-US" dirty="0" smtClean="0"/>
+              <a:t>Explain general observations for accuracy between </a:t>
+            </a:r>
+            <a:r>
+              <a:rPr lang="en-US" dirty="0" err="1" smtClean="0"/>
+              <a:t>feedforward</a:t>
+            </a:r>
+            <a:r>
+              <a:rPr lang="en-US" dirty="0" smtClean="0"/>
+              <a:t> vs. recurrent neural networks</a:t>
+            </a:r>
+            <a:endParaRPr lang="en-US" dirty="0"/>
           </a:p>
         </p:txBody>
       </p:sp>

</xml_diff>

<commit_message>
final project final update
</commit_message>
<xml_diff>
--- a/Kojack_Presentation.pptx
+++ b/Kojack_Presentation.pptx
@@ -4,25 +4,29 @@
   <p:sldMasterIdLst>
     <p:sldMasterId id="2147483648" r:id="rId1"/>
   </p:sldMasterIdLst>
+  <p:notesMasterIdLst>
+    <p:notesMasterId r:id="rId21"/>
+  </p:notesMasterIdLst>
   <p:sldIdLst>
     <p:sldId id="256" r:id="rId2"/>
     <p:sldId id="266" r:id="rId3"/>
     <p:sldId id="269" r:id="rId4"/>
     <p:sldId id="257" r:id="rId5"/>
     <p:sldId id="260" r:id="rId6"/>
-    <p:sldId id="267" r:id="rId7"/>
-    <p:sldId id="264" r:id="rId8"/>
-    <p:sldId id="265" r:id="rId9"/>
-    <p:sldId id="262" r:id="rId10"/>
-    <p:sldId id="261" r:id="rId11"/>
-    <p:sldId id="258" r:id="rId12"/>
-    <p:sldId id="278" r:id="rId13"/>
-    <p:sldId id="274" r:id="rId14"/>
-    <p:sldId id="275" r:id="rId15"/>
-    <p:sldId id="276" r:id="rId16"/>
-    <p:sldId id="277" r:id="rId17"/>
+    <p:sldId id="265" r:id="rId7"/>
+    <p:sldId id="279" r:id="rId8"/>
+    <p:sldId id="264" r:id="rId9"/>
+    <p:sldId id="278" r:id="rId10"/>
+    <p:sldId id="274" r:id="rId11"/>
+    <p:sldId id="275" r:id="rId12"/>
+    <p:sldId id="276" r:id="rId13"/>
+    <p:sldId id="277" r:id="rId14"/>
+    <p:sldId id="280" r:id="rId15"/>
+    <p:sldId id="281" r:id="rId16"/>
+    <p:sldId id="282" r:id="rId17"/>
     <p:sldId id="273" r:id="rId18"/>
     <p:sldId id="259" r:id="rId19"/>
+    <p:sldId id="262" r:id="rId20"/>
   </p:sldIdLst>
   <p:sldSz cx="9144000" cy="6858000" type="screen4x3"/>
   <p:notesSz cx="6858000" cy="9144000"/>
@@ -122,6 +126,472 @@
     </a:lvl9pPr>
   </p:defaultTextStyle>
 </p:presentation>
+</file>
+
+<file path=ppt/notesMasters/notesMaster1.xml><?xml version="1.0" encoding="utf-8"?>
+<p:notesMaster xmlns:a="http://schemas.openxmlformats.org/drawingml/2006/main" xmlns:r="http://schemas.openxmlformats.org/officeDocument/2006/relationships" xmlns:p="http://schemas.openxmlformats.org/presentationml/2006/main">
+  <p:cSld>
+    <p:bg>
+      <p:bgRef idx="1001">
+        <a:schemeClr val="bg1"/>
+      </p:bgRef>
+    </p:bg>
+    <p:spTree>
+      <p:nvGrpSpPr>
+        <p:cNvPr id="1" name=""/>
+        <p:cNvGrpSpPr/>
+        <p:nvPr/>
+      </p:nvGrpSpPr>
+      <p:grpSpPr>
+        <a:xfrm>
+          <a:off x="0" y="0"/>
+          <a:ext cx="0" cy="0"/>
+          <a:chOff x="0" y="0"/>
+          <a:chExt cx="0" cy="0"/>
+        </a:xfrm>
+      </p:grpSpPr>
+      <p:sp>
+        <p:nvSpPr>
+          <p:cNvPr id="2" name="Header Placeholder 1"/>
+          <p:cNvSpPr>
+            <a:spLocks noGrp="1"/>
+          </p:cNvSpPr>
+          <p:nvPr>
+            <p:ph type="hdr" sz="quarter"/>
+          </p:nvPr>
+        </p:nvSpPr>
+        <p:spPr>
+          <a:xfrm>
+            <a:off x="0" y="0"/>
+            <a:ext cx="2971800" cy="457200"/>
+          </a:xfrm>
+          <a:prstGeom prst="rect">
+            <a:avLst/>
+          </a:prstGeom>
+        </p:spPr>
+        <p:txBody>
+          <a:bodyPr vert="horz" lIns="91440" tIns="45720" rIns="91440" bIns="45720" rtlCol="0"/>
+          <a:lstStyle>
+            <a:lvl1pPr algn="l">
+              <a:defRPr sz="1200"/>
+            </a:lvl1pPr>
+          </a:lstStyle>
+          <a:p>
+            <a:endParaRPr lang="en-US"/>
+          </a:p>
+        </p:txBody>
+      </p:sp>
+      <p:sp>
+        <p:nvSpPr>
+          <p:cNvPr id="3" name="Date Placeholder 2"/>
+          <p:cNvSpPr>
+            <a:spLocks noGrp="1"/>
+          </p:cNvSpPr>
+          <p:nvPr>
+            <p:ph type="dt" idx="1"/>
+          </p:nvPr>
+        </p:nvSpPr>
+        <p:spPr>
+          <a:xfrm>
+            <a:off x="3884613" y="0"/>
+            <a:ext cx="2971800" cy="457200"/>
+          </a:xfrm>
+          <a:prstGeom prst="rect">
+            <a:avLst/>
+          </a:prstGeom>
+        </p:spPr>
+        <p:txBody>
+          <a:bodyPr vert="horz" lIns="91440" tIns="45720" rIns="91440" bIns="45720" rtlCol="0"/>
+          <a:lstStyle>
+            <a:lvl1pPr algn="r">
+              <a:defRPr sz="1200"/>
+            </a:lvl1pPr>
+          </a:lstStyle>
+          <a:p>
+            <a:fld id="{B0854CE3-46E5-224B-8FF8-F0A42939C4C6}" type="datetimeFigureOut">
+              <a:rPr lang="en-US" smtClean="0"/>
+              <a:t>9/17/15</a:t>
+            </a:fld>
+            <a:endParaRPr lang="en-US"/>
+          </a:p>
+        </p:txBody>
+      </p:sp>
+      <p:sp>
+        <p:nvSpPr>
+          <p:cNvPr id="4" name="Slide Image Placeholder 3"/>
+          <p:cNvSpPr>
+            <a:spLocks noGrp="1" noRot="1" noChangeAspect="1"/>
+          </p:cNvSpPr>
+          <p:nvPr>
+            <p:ph type="sldImg" idx="2"/>
+          </p:nvPr>
+        </p:nvSpPr>
+        <p:spPr>
+          <a:xfrm>
+            <a:off x="1143000" y="685800"/>
+            <a:ext cx="4572000" cy="3429000"/>
+          </a:xfrm>
+          <a:prstGeom prst="rect">
+            <a:avLst/>
+          </a:prstGeom>
+          <a:noFill/>
+          <a:ln w="12700">
+            <a:solidFill>
+              <a:prstClr val="black"/>
+            </a:solidFill>
+          </a:ln>
+        </p:spPr>
+        <p:txBody>
+          <a:bodyPr vert="horz" lIns="91440" tIns="45720" rIns="91440" bIns="45720" rtlCol="0" anchor="ctr"/>
+          <a:lstStyle/>
+          <a:p>
+            <a:endParaRPr lang="en-US"/>
+          </a:p>
+        </p:txBody>
+      </p:sp>
+      <p:sp>
+        <p:nvSpPr>
+          <p:cNvPr id="5" name="Notes Placeholder 4"/>
+          <p:cNvSpPr>
+            <a:spLocks noGrp="1"/>
+          </p:cNvSpPr>
+          <p:nvPr>
+            <p:ph type="body" sz="quarter" idx="3"/>
+          </p:nvPr>
+        </p:nvSpPr>
+        <p:spPr>
+          <a:xfrm>
+            <a:off x="685800" y="4343400"/>
+            <a:ext cx="5486400" cy="4114800"/>
+          </a:xfrm>
+          <a:prstGeom prst="rect">
+            <a:avLst/>
+          </a:prstGeom>
+        </p:spPr>
+        <p:txBody>
+          <a:bodyPr vert="horz" lIns="91440" tIns="45720" rIns="91440" bIns="45720" rtlCol="0"/>
+          <a:lstStyle/>
+          <a:p>
+            <a:pPr lvl="0"/>
+            <a:r>
+              <a:rPr lang="en-US" smtClean="0"/>
+              <a:t>Click to edit Master text styles</a:t>
+            </a:r>
+          </a:p>
+          <a:p>
+            <a:pPr lvl="1"/>
+            <a:r>
+              <a:rPr lang="en-US" smtClean="0"/>
+              <a:t>Second level</a:t>
+            </a:r>
+          </a:p>
+          <a:p>
+            <a:pPr lvl="2"/>
+            <a:r>
+              <a:rPr lang="en-US" smtClean="0"/>
+              <a:t>Third level</a:t>
+            </a:r>
+          </a:p>
+          <a:p>
+            <a:pPr lvl="3"/>
+            <a:r>
+              <a:rPr lang="en-US" smtClean="0"/>
+              <a:t>Fourth level</a:t>
+            </a:r>
+          </a:p>
+          <a:p>
+            <a:pPr lvl="4"/>
+            <a:r>
+              <a:rPr lang="en-US" smtClean="0"/>
+              <a:t>Fifth level</a:t>
+            </a:r>
+            <a:endParaRPr lang="en-US"/>
+          </a:p>
+        </p:txBody>
+      </p:sp>
+      <p:sp>
+        <p:nvSpPr>
+          <p:cNvPr id="6" name="Footer Placeholder 5"/>
+          <p:cNvSpPr>
+            <a:spLocks noGrp="1"/>
+          </p:cNvSpPr>
+          <p:nvPr>
+            <p:ph type="ftr" sz="quarter" idx="4"/>
+          </p:nvPr>
+        </p:nvSpPr>
+        <p:spPr>
+          <a:xfrm>
+            <a:off x="0" y="8685213"/>
+            <a:ext cx="2971800" cy="457200"/>
+          </a:xfrm>
+          <a:prstGeom prst="rect">
+            <a:avLst/>
+          </a:prstGeom>
+        </p:spPr>
+        <p:txBody>
+          <a:bodyPr vert="horz" lIns="91440" tIns="45720" rIns="91440" bIns="45720" rtlCol="0" anchor="b"/>
+          <a:lstStyle>
+            <a:lvl1pPr algn="l">
+              <a:defRPr sz="1200"/>
+            </a:lvl1pPr>
+          </a:lstStyle>
+          <a:p>
+            <a:endParaRPr lang="en-US"/>
+          </a:p>
+        </p:txBody>
+      </p:sp>
+      <p:sp>
+        <p:nvSpPr>
+          <p:cNvPr id="7" name="Slide Number Placeholder 6"/>
+          <p:cNvSpPr>
+            <a:spLocks noGrp="1"/>
+          </p:cNvSpPr>
+          <p:nvPr>
+            <p:ph type="sldNum" sz="quarter" idx="5"/>
+          </p:nvPr>
+        </p:nvSpPr>
+        <p:spPr>
+          <a:xfrm>
+            <a:off x="3884613" y="8685213"/>
+            <a:ext cx="2971800" cy="457200"/>
+          </a:xfrm>
+          <a:prstGeom prst="rect">
+            <a:avLst/>
+          </a:prstGeom>
+        </p:spPr>
+        <p:txBody>
+          <a:bodyPr vert="horz" lIns="91440" tIns="45720" rIns="91440" bIns="45720" rtlCol="0" anchor="b"/>
+          <a:lstStyle>
+            <a:lvl1pPr algn="r">
+              <a:defRPr sz="1200"/>
+            </a:lvl1pPr>
+          </a:lstStyle>
+          <a:p>
+            <a:fld id="{3997829B-BF3B-D943-A21C-7A7DDAE4C107}" type="slidenum">
+              <a:rPr lang="en-US" smtClean="0"/>
+              <a:t>‹#›</a:t>
+            </a:fld>
+            <a:endParaRPr lang="en-US"/>
+          </a:p>
+        </p:txBody>
+      </p:sp>
+    </p:spTree>
+    <p:extLst>
+      <p:ext uri="{BB962C8B-B14F-4D97-AF65-F5344CB8AC3E}">
+        <p14:creationId xmlns:p14="http://schemas.microsoft.com/office/powerpoint/2010/main" val="1331328093"/>
+      </p:ext>
+    </p:extLst>
+  </p:cSld>
+  <p:clrMap bg1="lt1" tx1="dk1" bg2="lt2" tx2="dk2" accent1="accent1" accent2="accent2" accent3="accent3" accent4="accent4" accent5="accent5" accent6="accent6" hlink="hlink" folHlink="folHlink"/>
+  <p:notesStyle>
+    <a:lvl1pPr marL="0" algn="l" defTabSz="457200" rtl="0" eaLnBrk="1" latinLnBrk="0" hangingPunct="1">
+      <a:defRPr sz="1200" kern="1200">
+        <a:solidFill>
+          <a:schemeClr val="tx1"/>
+        </a:solidFill>
+        <a:latin typeface="+mn-lt"/>
+        <a:ea typeface="+mn-ea"/>
+        <a:cs typeface="+mn-cs"/>
+      </a:defRPr>
+    </a:lvl1pPr>
+    <a:lvl2pPr marL="457200" algn="l" defTabSz="457200" rtl="0" eaLnBrk="1" latinLnBrk="0" hangingPunct="1">
+      <a:defRPr sz="1200" kern="1200">
+        <a:solidFill>
+          <a:schemeClr val="tx1"/>
+        </a:solidFill>
+        <a:latin typeface="+mn-lt"/>
+        <a:ea typeface="+mn-ea"/>
+        <a:cs typeface="+mn-cs"/>
+      </a:defRPr>
+    </a:lvl2pPr>
+    <a:lvl3pPr marL="914400" algn="l" defTabSz="457200" rtl="0" eaLnBrk="1" latinLnBrk="0" hangingPunct="1">
+      <a:defRPr sz="1200" kern="1200">
+        <a:solidFill>
+          <a:schemeClr val="tx1"/>
+        </a:solidFill>
+        <a:latin typeface="+mn-lt"/>
+        <a:ea typeface="+mn-ea"/>
+        <a:cs typeface="+mn-cs"/>
+      </a:defRPr>
+    </a:lvl3pPr>
+    <a:lvl4pPr marL="1371600" algn="l" defTabSz="457200" rtl="0" eaLnBrk="1" latinLnBrk="0" hangingPunct="1">
+      <a:defRPr sz="1200" kern="1200">
+        <a:solidFill>
+          <a:schemeClr val="tx1"/>
+        </a:solidFill>
+        <a:latin typeface="+mn-lt"/>
+        <a:ea typeface="+mn-ea"/>
+        <a:cs typeface="+mn-cs"/>
+      </a:defRPr>
+    </a:lvl4pPr>
+    <a:lvl5pPr marL="1828800" algn="l" defTabSz="457200" rtl="0" eaLnBrk="1" latinLnBrk="0" hangingPunct="1">
+      <a:defRPr sz="1200" kern="1200">
+        <a:solidFill>
+          <a:schemeClr val="tx1"/>
+        </a:solidFill>
+        <a:latin typeface="+mn-lt"/>
+        <a:ea typeface="+mn-ea"/>
+        <a:cs typeface="+mn-cs"/>
+      </a:defRPr>
+    </a:lvl5pPr>
+    <a:lvl6pPr marL="2286000" algn="l" defTabSz="457200" rtl="0" eaLnBrk="1" latinLnBrk="0" hangingPunct="1">
+      <a:defRPr sz="1200" kern="1200">
+        <a:solidFill>
+          <a:schemeClr val="tx1"/>
+        </a:solidFill>
+        <a:latin typeface="+mn-lt"/>
+        <a:ea typeface="+mn-ea"/>
+        <a:cs typeface="+mn-cs"/>
+      </a:defRPr>
+    </a:lvl6pPr>
+    <a:lvl7pPr marL="2743200" algn="l" defTabSz="457200" rtl="0" eaLnBrk="1" latinLnBrk="0" hangingPunct="1">
+      <a:defRPr sz="1200" kern="1200">
+        <a:solidFill>
+          <a:schemeClr val="tx1"/>
+        </a:solidFill>
+        <a:latin typeface="+mn-lt"/>
+        <a:ea typeface="+mn-ea"/>
+        <a:cs typeface="+mn-cs"/>
+      </a:defRPr>
+    </a:lvl7pPr>
+    <a:lvl8pPr marL="3200400" algn="l" defTabSz="457200" rtl="0" eaLnBrk="1" latinLnBrk="0" hangingPunct="1">
+      <a:defRPr sz="1200" kern="1200">
+        <a:solidFill>
+          <a:schemeClr val="tx1"/>
+        </a:solidFill>
+        <a:latin typeface="+mn-lt"/>
+        <a:ea typeface="+mn-ea"/>
+        <a:cs typeface="+mn-cs"/>
+      </a:defRPr>
+    </a:lvl8pPr>
+    <a:lvl9pPr marL="3657600" algn="l" defTabSz="457200" rtl="0" eaLnBrk="1" latinLnBrk="0" hangingPunct="1">
+      <a:defRPr sz="1200" kern="1200">
+        <a:solidFill>
+          <a:schemeClr val="tx1"/>
+        </a:solidFill>
+        <a:latin typeface="+mn-lt"/>
+        <a:ea typeface="+mn-ea"/>
+        <a:cs typeface="+mn-cs"/>
+      </a:defRPr>
+    </a:lvl9pPr>
+  </p:notesStyle>
+</p:notesMaster>
+</file>
+
+<file path=ppt/notesSlides/notesSlide1.xml><?xml version="1.0" encoding="utf-8"?>
+<p:notes xmlns:a="http://schemas.openxmlformats.org/drawingml/2006/main" xmlns:r="http://schemas.openxmlformats.org/officeDocument/2006/relationships" xmlns:p="http://schemas.openxmlformats.org/presentationml/2006/main">
+  <p:cSld>
+    <p:spTree>
+      <p:nvGrpSpPr>
+        <p:cNvPr id="1" name=""/>
+        <p:cNvGrpSpPr/>
+        <p:nvPr/>
+      </p:nvGrpSpPr>
+      <p:grpSpPr>
+        <a:xfrm>
+          <a:off x="0" y="0"/>
+          <a:ext cx="0" cy="0"/>
+          <a:chOff x="0" y="0"/>
+          <a:chExt cx="0" cy="0"/>
+        </a:xfrm>
+      </p:grpSpPr>
+      <p:sp>
+        <p:nvSpPr>
+          <p:cNvPr id="2" name="Slide Image Placeholder 1"/>
+          <p:cNvSpPr>
+            <a:spLocks noGrp="1" noRot="1" noChangeAspect="1"/>
+          </p:cNvSpPr>
+          <p:nvPr>
+            <p:ph type="sldImg"/>
+          </p:nvPr>
+        </p:nvSpPr>
+        <p:spPr/>
+      </p:sp>
+      <p:sp>
+        <p:nvSpPr>
+          <p:cNvPr id="3" name="Notes Placeholder 2"/>
+          <p:cNvSpPr>
+            <a:spLocks noGrp="1"/>
+          </p:cNvSpPr>
+          <p:nvPr>
+            <p:ph type="body" idx="1"/>
+          </p:nvPr>
+        </p:nvSpPr>
+        <p:spPr/>
+        <p:txBody>
+          <a:bodyPr/>
+          <a:lstStyle/>
+          <a:p>
+            <a:r>
+              <a:rPr lang="en-US" dirty="0" smtClean="0"/>
+              <a:t>http://</a:t>
+            </a:r>
+            <a:r>
+              <a:rPr lang="en-US" dirty="0" err="1" smtClean="0"/>
+              <a:t>cs.stanford.edu</a:t>
+            </a:r>
+            <a:r>
+              <a:rPr lang="en-US" dirty="0" smtClean="0"/>
+              <a:t>/people/</a:t>
+            </a:r>
+            <a:r>
+              <a:rPr lang="en-US" dirty="0" err="1" smtClean="0"/>
+              <a:t>eroberts</a:t>
+            </a:r>
+            <a:r>
+              <a:rPr lang="en-US" dirty="0" smtClean="0"/>
+              <a:t>/courses/</a:t>
+            </a:r>
+            <a:r>
+              <a:rPr lang="en-US" dirty="0" err="1" smtClean="0"/>
+              <a:t>soco</a:t>
+            </a:r>
+            <a:r>
+              <a:rPr lang="en-US" dirty="0" smtClean="0"/>
+              <a:t>/projects/neural-networks/Architecture/images/</a:t>
+            </a:r>
+            <a:r>
+              <a:rPr lang="en-US" dirty="0" err="1" smtClean="0"/>
+              <a:t>feedforward.jpg</a:t>
+            </a:r>
+            <a:endParaRPr lang="en-US" dirty="0"/>
+          </a:p>
+        </p:txBody>
+      </p:sp>
+      <p:sp>
+        <p:nvSpPr>
+          <p:cNvPr id="4" name="Slide Number Placeholder 3"/>
+          <p:cNvSpPr>
+            <a:spLocks noGrp="1"/>
+          </p:cNvSpPr>
+          <p:nvPr>
+            <p:ph type="sldNum" sz="quarter" idx="10"/>
+          </p:nvPr>
+        </p:nvSpPr>
+        <p:spPr/>
+        <p:txBody>
+          <a:bodyPr/>
+          <a:lstStyle/>
+          <a:p>
+            <a:fld id="{3997829B-BF3B-D943-A21C-7A7DDAE4C107}" type="slidenum">
+              <a:rPr lang="en-US" smtClean="0"/>
+              <a:t>14</a:t>
+            </a:fld>
+            <a:endParaRPr lang="en-US"/>
+          </a:p>
+        </p:txBody>
+      </p:sp>
+    </p:spTree>
+    <p:extLst>
+      <p:ext uri="{BB962C8B-B14F-4D97-AF65-F5344CB8AC3E}">
+        <p14:creationId xmlns:p14="http://schemas.microsoft.com/office/powerpoint/2010/main" val="3670282933"/>
+      </p:ext>
+    </p:extLst>
+  </p:cSld>
+  <p:clrMapOvr>
+    <a:masterClrMapping/>
+  </p:clrMapOvr>
+</p:notes>
 </file>
 
 <file path=ppt/slideLayouts/slideLayout1.xml><?xml version="1.0" encoding="utf-8"?>
@@ -3124,7 +3594,7 @@
         </p:nvSpPr>
         <p:spPr>
           <a:xfrm>
-            <a:off x="685800" y="2454177"/>
+            <a:off x="685800" y="2665861"/>
             <a:ext cx="7772400" cy="1470025"/>
           </a:xfrm>
         </p:spPr>
@@ -3143,7 +3613,28 @@
             </a:br>
             <a:r>
               <a:rPr lang="en-US" dirty="0" smtClean="0"/>
-              <a:t>with Supervised Learning Algorithms</a:t>
+              <a:t>with </a:t>
+            </a:r>
+            <a:br>
+              <a:rPr lang="en-US" dirty="0" smtClean="0"/>
+            </a:br>
+            <a:r>
+              <a:rPr lang="en-US" dirty="0" smtClean="0"/>
+              <a:t>Supervised Learning Algorithms</a:t>
+            </a:r>
+            <a:br>
+              <a:rPr lang="en-US" dirty="0" smtClean="0"/>
+            </a:br>
+            <a:r>
+              <a:rPr lang="en-US" dirty="0" smtClean="0"/>
+              <a:t/>
+            </a:r>
+            <a:br>
+              <a:rPr lang="en-US" dirty="0" smtClean="0"/>
+            </a:br>
+            <a:r>
+              <a:rPr lang="en-US" dirty="0" smtClean="0"/>
+              <a:t/>
             </a:r>
             <a:br>
               <a:rPr lang="en-US" dirty="0" smtClean="0"/>
@@ -3164,7 +3655,7 @@
         </p:nvSpPr>
         <p:spPr>
           <a:xfrm>
-            <a:off x="1371600" y="4110336"/>
+            <a:off x="1371600" y="4371828"/>
             <a:ext cx="6400800" cy="1752600"/>
           </a:xfrm>
         </p:spPr>
@@ -3200,353 +3691,6 @@
 </file>
 
 <file path=ppt/slides/slide10.xml><?xml version="1.0" encoding="utf-8"?>
-<p:sld xmlns:a="http://schemas.openxmlformats.org/drawingml/2006/main" xmlns:r="http://schemas.openxmlformats.org/officeDocument/2006/relationships" xmlns:p="http://schemas.openxmlformats.org/presentationml/2006/main">
-  <p:cSld>
-    <p:spTree>
-      <p:nvGrpSpPr>
-        <p:cNvPr id="1" name=""/>
-        <p:cNvGrpSpPr/>
-        <p:nvPr/>
-      </p:nvGrpSpPr>
-      <p:grpSpPr>
-        <a:xfrm>
-          <a:off x="0" y="0"/>
-          <a:ext cx="0" cy="0"/>
-          <a:chOff x="0" y="0"/>
-          <a:chExt cx="0" cy="0"/>
-        </a:xfrm>
-      </p:grpSpPr>
-      <p:sp>
-        <p:nvSpPr>
-          <p:cNvPr id="2" name="Title 1"/>
-          <p:cNvSpPr>
-            <a:spLocks noGrp="1"/>
-          </p:cNvSpPr>
-          <p:nvPr>
-            <p:ph type="title"/>
-          </p:nvPr>
-        </p:nvSpPr>
-        <p:spPr/>
-        <p:txBody>
-          <a:bodyPr/>
-          <a:lstStyle/>
-          <a:p>
-            <a:r>
-              <a:rPr lang="en-US" dirty="0" smtClean="0"/>
-              <a:t>Methodology</a:t>
-            </a:r>
-            <a:endParaRPr lang="en-US" dirty="0"/>
-          </a:p>
-        </p:txBody>
-      </p:sp>
-      <p:sp>
-        <p:nvSpPr>
-          <p:cNvPr id="3" name="Content Placeholder 2"/>
-          <p:cNvSpPr>
-            <a:spLocks noGrp="1"/>
-          </p:cNvSpPr>
-          <p:nvPr>
-            <p:ph idx="1"/>
-          </p:nvPr>
-        </p:nvSpPr>
-        <p:spPr>
-          <a:xfrm>
-            <a:off x="457200" y="1425872"/>
-            <a:ext cx="8229600" cy="5111486"/>
-          </a:xfrm>
-        </p:spPr>
-        <p:txBody>
-          <a:bodyPr>
-            <a:normAutofit fontScale="92500" lnSpcReduction="20000"/>
-          </a:bodyPr>
-          <a:lstStyle/>
-          <a:p>
-            <a:r>
-              <a:rPr lang="en-US" dirty="0" smtClean="0"/>
-              <a:t>Feed Forward Neural Networks</a:t>
-            </a:r>
-          </a:p>
-          <a:p>
-            <a:pPr lvl="1"/>
-            <a:r>
-              <a:rPr lang="en-US" dirty="0" smtClean="0"/>
-              <a:t>Data only goes forward starting from input nodes to output nodes</a:t>
-            </a:r>
-          </a:p>
-          <a:p>
-            <a:pPr lvl="1"/>
-            <a:r>
-              <a:rPr lang="en-US" dirty="0" smtClean="0"/>
-              <a:t>Used </a:t>
-            </a:r>
-            <a:r>
-              <a:rPr lang="en-US" dirty="0" err="1" smtClean="0"/>
-              <a:t>Nolearn</a:t>
-            </a:r>
-            <a:r>
-              <a:rPr lang="en-US" dirty="0" smtClean="0"/>
-              <a:t>/</a:t>
-            </a:r>
-            <a:r>
-              <a:rPr lang="en-US" dirty="0" err="1" smtClean="0"/>
-              <a:t>Lasagne</a:t>
-            </a:r>
-            <a:r>
-              <a:rPr lang="en-US" dirty="0" smtClean="0"/>
-              <a:t>/</a:t>
-            </a:r>
-            <a:r>
-              <a:rPr lang="en-US" dirty="0" err="1" smtClean="0"/>
-              <a:t>Theano</a:t>
-            </a:r>
-            <a:endParaRPr lang="en-US" dirty="0" smtClean="0"/>
-          </a:p>
-          <a:p>
-            <a:pPr lvl="1"/>
-            <a:endParaRPr lang="en-US" dirty="0" smtClean="0"/>
-          </a:p>
-          <a:p>
-            <a:r>
-              <a:rPr lang="en-US" dirty="0" smtClean="0"/>
-              <a:t>Recurrent Neural Networks</a:t>
-            </a:r>
-          </a:p>
-          <a:p>
-            <a:pPr lvl="1"/>
-            <a:r>
-              <a:rPr lang="en-US" dirty="0" smtClean="0"/>
-              <a:t>Loops exist within the layers such that outputs can be inputs to nodes at the same layer or to prior layers</a:t>
-            </a:r>
-          </a:p>
-          <a:p>
-            <a:pPr lvl="1"/>
-            <a:r>
-              <a:rPr lang="en-US" dirty="0" smtClean="0"/>
-              <a:t>Can be thought of as a way to introduce a kind of memory into the system</a:t>
-            </a:r>
-          </a:p>
-          <a:p>
-            <a:pPr lvl="1"/>
-            <a:r>
-              <a:rPr lang="en-US" dirty="0" smtClean="0"/>
-              <a:t>Works well for sequential data such as time series and text data</a:t>
-            </a:r>
-          </a:p>
-          <a:p>
-            <a:pPr lvl="1"/>
-            <a:r>
-              <a:rPr lang="en-US" dirty="0" smtClean="0"/>
-              <a:t>Used </a:t>
-            </a:r>
-            <a:r>
-              <a:rPr lang="en-US" dirty="0" err="1" smtClean="0"/>
-              <a:t>PyBrain</a:t>
-            </a:r>
-            <a:endParaRPr lang="en-US" dirty="0" smtClean="0"/>
-          </a:p>
-          <a:p>
-            <a:pPr lvl="1"/>
-            <a:endParaRPr lang="en-US" dirty="0" smtClean="0"/>
-          </a:p>
-          <a:p>
-            <a:pPr lvl="1"/>
-            <a:endParaRPr lang="en-US" dirty="0" smtClean="0"/>
-          </a:p>
-          <a:p>
-            <a:pPr lvl="1"/>
-            <a:endParaRPr lang="en-US" dirty="0"/>
-          </a:p>
-          <a:p>
-            <a:pPr lvl="1"/>
-            <a:endParaRPr lang="en-US" dirty="0"/>
-          </a:p>
-        </p:txBody>
-      </p:sp>
-    </p:spTree>
-    <p:extLst>
-      <p:ext uri="{BB962C8B-B14F-4D97-AF65-F5344CB8AC3E}">
-        <p14:creationId xmlns:p14="http://schemas.microsoft.com/office/powerpoint/2010/main" val="2014615936"/>
-      </p:ext>
-    </p:extLst>
-  </p:cSld>
-  <p:clrMapOvr>
-    <a:masterClrMapping/>
-  </p:clrMapOvr>
-</p:sld>
-</file>
-
-<file path=ppt/slides/slide11.xml><?xml version="1.0" encoding="utf-8"?>
-<p:sld xmlns:a="http://schemas.openxmlformats.org/drawingml/2006/main" xmlns:r="http://schemas.openxmlformats.org/officeDocument/2006/relationships" xmlns:p="http://schemas.openxmlformats.org/presentationml/2006/main">
-  <p:cSld>
-    <p:spTree>
-      <p:nvGrpSpPr>
-        <p:cNvPr id="1" name=""/>
-        <p:cNvGrpSpPr/>
-        <p:nvPr/>
-      </p:nvGrpSpPr>
-      <p:grpSpPr>
-        <a:xfrm>
-          <a:off x="0" y="0"/>
-          <a:ext cx="0" cy="0"/>
-          <a:chOff x="0" y="0"/>
-          <a:chExt cx="0" cy="0"/>
-        </a:xfrm>
-      </p:grpSpPr>
-      <p:sp>
-        <p:nvSpPr>
-          <p:cNvPr id="2" name="Title 1"/>
-          <p:cNvSpPr>
-            <a:spLocks noGrp="1"/>
-          </p:cNvSpPr>
-          <p:nvPr>
-            <p:ph type="title"/>
-          </p:nvPr>
-        </p:nvSpPr>
-        <p:spPr/>
-        <p:txBody>
-          <a:bodyPr/>
-          <a:lstStyle/>
-          <a:p>
-            <a:r>
-              <a:rPr lang="en-US" dirty="0" smtClean="0"/>
-              <a:t>Accuracy Visualizations</a:t>
-            </a:r>
-            <a:endParaRPr lang="en-US" dirty="0"/>
-          </a:p>
-        </p:txBody>
-      </p:sp>
-      <p:sp>
-        <p:nvSpPr>
-          <p:cNvPr id="3" name="Content Placeholder 2"/>
-          <p:cNvSpPr>
-            <a:spLocks noGrp="1"/>
-          </p:cNvSpPr>
-          <p:nvPr>
-            <p:ph idx="1"/>
-          </p:nvPr>
-        </p:nvSpPr>
-        <p:spPr/>
-        <p:txBody>
-          <a:bodyPr/>
-          <a:lstStyle/>
-          <a:p>
-            <a:r>
-              <a:rPr lang="en-US" dirty="0" smtClean="0"/>
-              <a:t>Graph of Accuracy vs. various number of layers of a Feed Forward Neural Net Structure</a:t>
-            </a:r>
-          </a:p>
-          <a:p>
-            <a:endParaRPr lang="en-US" dirty="0"/>
-          </a:p>
-          <a:p>
-            <a:r>
-              <a:rPr lang="en-US" dirty="0" smtClean="0"/>
-              <a:t>Graph of Accuracy vs. various number of nodes for two hidden layers</a:t>
-            </a:r>
-          </a:p>
-          <a:p>
-            <a:endParaRPr lang="en-US" dirty="0" smtClean="0"/>
-          </a:p>
-          <a:p>
-            <a:r>
-              <a:rPr lang="en-US" dirty="0"/>
-              <a:t>G</a:t>
-            </a:r>
-            <a:r>
-              <a:rPr lang="en-US" dirty="0" smtClean="0"/>
-              <a:t>raph of Accuracy for Feed Forward vs. Recurrent Neural Networks</a:t>
-            </a:r>
-            <a:endParaRPr lang="en-US" dirty="0"/>
-          </a:p>
-        </p:txBody>
-      </p:sp>
-    </p:spTree>
-    <p:extLst>
-      <p:ext uri="{BB962C8B-B14F-4D97-AF65-F5344CB8AC3E}">
-        <p14:creationId xmlns:p14="http://schemas.microsoft.com/office/powerpoint/2010/main" val="2319253204"/>
-      </p:ext>
-    </p:extLst>
-  </p:cSld>
-  <p:clrMapOvr>
-    <a:masterClrMapping/>
-  </p:clrMapOvr>
-</p:sld>
-</file>
-
-<file path=ppt/slides/slide12.xml><?xml version="1.0" encoding="utf-8"?>
-<p:sld xmlns:a="http://schemas.openxmlformats.org/drawingml/2006/main" xmlns:r="http://schemas.openxmlformats.org/officeDocument/2006/relationships" xmlns:p="http://schemas.openxmlformats.org/presentationml/2006/main">
-  <p:cSld>
-    <p:spTree>
-      <p:nvGrpSpPr>
-        <p:cNvPr id="1" name=""/>
-        <p:cNvGrpSpPr/>
-        <p:nvPr/>
-      </p:nvGrpSpPr>
-      <p:grpSpPr>
-        <a:xfrm>
-          <a:off x="0" y="0"/>
-          <a:ext cx="0" cy="0"/>
-          <a:chOff x="0" y="0"/>
-          <a:chExt cx="0" cy="0"/>
-        </a:xfrm>
-      </p:grpSpPr>
-      <p:sp>
-        <p:nvSpPr>
-          <p:cNvPr id="2" name="Title 1"/>
-          <p:cNvSpPr>
-            <a:spLocks noGrp="1"/>
-          </p:cNvSpPr>
-          <p:nvPr>
-            <p:ph type="title"/>
-          </p:nvPr>
-        </p:nvSpPr>
-        <p:spPr/>
-        <p:txBody>
-          <a:bodyPr/>
-          <a:lstStyle/>
-          <a:p>
-            <a:endParaRPr lang="en-US"/>
-          </a:p>
-        </p:txBody>
-      </p:sp>
-      <p:pic>
-        <p:nvPicPr>
-          <p:cNvPr id="7" name="Picture 6"/>
-          <p:cNvPicPr>
-            <a:picLocks noChangeAspect="1"/>
-          </p:cNvPicPr>
-          <p:nvPr/>
-        </p:nvPicPr>
-        <p:blipFill>
-          <a:blip r:embed="rId2"/>
-          <a:stretch>
-            <a:fillRect/>
-          </a:stretch>
-        </p:blipFill>
-        <p:spPr>
-          <a:xfrm>
-            <a:off x="357592" y="1506095"/>
-            <a:ext cx="8229600" cy="5198440"/>
-          </a:xfrm>
-          <a:prstGeom prst="rect">
-            <a:avLst/>
-          </a:prstGeom>
-        </p:spPr>
-      </p:pic>
-    </p:spTree>
-    <p:extLst>
-      <p:ext uri="{BB962C8B-B14F-4D97-AF65-F5344CB8AC3E}">
-        <p14:creationId xmlns:p14="http://schemas.microsoft.com/office/powerpoint/2010/main" val="1327199227"/>
-      </p:ext>
-    </p:extLst>
-  </p:cSld>
-  <p:clrMapOvr>
-    <a:masterClrMapping/>
-  </p:clrMapOvr>
-</p:sld>
-</file>
-
-<file path=ppt/slides/slide13.xml><?xml version="1.0" encoding="utf-8"?>
 <p:sld xmlns:a="http://schemas.openxmlformats.org/drawingml/2006/main" xmlns:r="http://schemas.openxmlformats.org/officeDocument/2006/relationships" xmlns:p="http://schemas.openxmlformats.org/presentationml/2006/main">
   <p:cSld>
     <p:spTree>
@@ -3632,7 +3776,7 @@
 </p:sld>
 </file>
 
-<file path=ppt/slides/slide14.xml><?xml version="1.0" encoding="utf-8"?>
+<file path=ppt/slides/slide11.xml><?xml version="1.0" encoding="utf-8"?>
 <p:sld xmlns:a="http://schemas.openxmlformats.org/drawingml/2006/main" xmlns:r="http://schemas.openxmlformats.org/officeDocument/2006/relationships" xmlns:p="http://schemas.openxmlformats.org/presentationml/2006/main">
   <p:cSld>
     <p:spTree>
@@ -3718,7 +3862,7 @@
 </p:sld>
 </file>
 
-<file path=ppt/slides/slide15.xml><?xml version="1.0" encoding="utf-8"?>
+<file path=ppt/slides/slide12.xml><?xml version="1.0" encoding="utf-8"?>
 <p:sld xmlns:a="http://schemas.openxmlformats.org/drawingml/2006/main" xmlns:r="http://schemas.openxmlformats.org/officeDocument/2006/relationships" xmlns:p="http://schemas.openxmlformats.org/presentationml/2006/main">
   <p:cSld>
     <p:spTree>
@@ -3745,18 +3889,30 @@
             <p:ph type="title"/>
           </p:nvPr>
         </p:nvSpPr>
-        <p:spPr/>
+        <p:spPr>
+          <a:xfrm>
+            <a:off x="457200" y="411610"/>
+            <a:ext cx="8229600" cy="1143000"/>
+          </a:xfrm>
+        </p:spPr>
         <p:txBody>
           <a:bodyPr>
-            <a:normAutofit/>
+            <a:noAutofit/>
           </a:bodyPr>
           <a:lstStyle/>
           <a:p>
             <a:r>
-              <a:rPr lang="en-US" dirty="0" smtClean="0"/>
-              <a:t>Prediction Accuracy for Oil Prices</a:t>
-            </a:r>
-            <a:endParaRPr lang="en-US" dirty="0"/>
+              <a:rPr lang="en-US" sz="3600" dirty="0" smtClean="0"/>
+              <a:t>Prediction Accuracy for OIL ETF</a:t>
+            </a:r>
+            <a:r>
+              <a:rPr lang="en-US" sz="3600" dirty="0" smtClean="0"/>
+              <a:t/>
+            </a:r>
+            <a:br>
+              <a:rPr lang="en-US" sz="3600" dirty="0" smtClean="0"/>
+            </a:br>
+            <a:endParaRPr lang="en-US" sz="3600" dirty="0"/>
           </a:p>
         </p:txBody>
       </p:sp>
@@ -3790,10 +3946,497 @@
           </a:prstGeom>
         </p:spPr>
       </p:pic>
+      <p:cxnSp>
+        <p:nvCxnSpPr>
+          <p:cNvPr id="11" name="Straight Arrow Connector 10"/>
+          <p:cNvCxnSpPr/>
+          <p:nvPr/>
+        </p:nvCxnSpPr>
+        <p:spPr>
+          <a:xfrm>
+            <a:off x="1494169" y="2328543"/>
+            <a:ext cx="921403" cy="435826"/>
+          </a:xfrm>
+          <a:prstGeom prst="straightConnector1">
+            <a:avLst/>
+          </a:prstGeom>
+          <a:ln>
+            <a:tailEnd type="arrow"/>
+          </a:ln>
+        </p:spPr>
+        <p:style>
+          <a:lnRef idx="3">
+            <a:schemeClr val="accent2"/>
+          </a:lnRef>
+          <a:fillRef idx="0">
+            <a:schemeClr val="accent2"/>
+          </a:fillRef>
+          <a:effectRef idx="2">
+            <a:schemeClr val="accent2"/>
+          </a:effectRef>
+          <a:fontRef idx="minor">
+            <a:schemeClr val="tx1"/>
+          </a:fontRef>
+        </p:style>
+      </p:cxnSp>
+      <p:sp>
+        <p:nvSpPr>
+          <p:cNvPr id="12" name="TextBox 11"/>
+          <p:cNvSpPr txBox="1"/>
+          <p:nvPr/>
+        </p:nvSpPr>
+        <p:spPr>
+          <a:xfrm>
+            <a:off x="3872379" y="1631232"/>
+            <a:ext cx="4208575" cy="1015663"/>
+          </a:xfrm>
+          <a:prstGeom prst="rect">
+            <a:avLst/>
+          </a:prstGeom>
+          <a:noFill/>
+        </p:spPr>
+        <p:txBody>
+          <a:bodyPr wrap="square" rtlCol="0">
+            <a:spAutoFit/>
+          </a:bodyPr>
+          <a:lstStyle/>
+          <a:p>
+            <a:r>
+              <a:rPr lang="en-US" sz="2000" b="1" dirty="0" smtClean="0"/>
+              <a:t>Training on less data produces better results since picks up on changes in the market more quickly</a:t>
+            </a:r>
+            <a:endParaRPr lang="en-US" sz="2000" b="1" dirty="0"/>
+          </a:p>
+        </p:txBody>
+      </p:sp>
+      <p:cxnSp>
+        <p:nvCxnSpPr>
+          <p:cNvPr id="18" name="Straight Arrow Connector 17"/>
+          <p:cNvCxnSpPr/>
+          <p:nvPr/>
+        </p:nvCxnSpPr>
+        <p:spPr>
+          <a:xfrm>
+            <a:off x="2567972" y="2842057"/>
+            <a:ext cx="921403" cy="435826"/>
+          </a:xfrm>
+          <a:prstGeom prst="straightConnector1">
+            <a:avLst/>
+          </a:prstGeom>
+          <a:ln>
+            <a:tailEnd type="arrow"/>
+          </a:ln>
+        </p:spPr>
+        <p:style>
+          <a:lnRef idx="3">
+            <a:schemeClr val="accent2"/>
+          </a:lnRef>
+          <a:fillRef idx="0">
+            <a:schemeClr val="accent2"/>
+          </a:fillRef>
+          <a:effectRef idx="2">
+            <a:schemeClr val="accent2"/>
+          </a:effectRef>
+          <a:fontRef idx="minor">
+            <a:schemeClr val="tx1"/>
+          </a:fontRef>
+        </p:style>
+      </p:cxnSp>
+      <p:cxnSp>
+        <p:nvCxnSpPr>
+          <p:cNvPr id="19" name="Straight Arrow Connector 18"/>
+          <p:cNvCxnSpPr/>
+          <p:nvPr/>
+        </p:nvCxnSpPr>
+        <p:spPr>
+          <a:xfrm>
+            <a:off x="3613891" y="3352591"/>
+            <a:ext cx="921403" cy="435826"/>
+          </a:xfrm>
+          <a:prstGeom prst="straightConnector1">
+            <a:avLst/>
+          </a:prstGeom>
+          <a:ln>
+            <a:tailEnd type="arrow"/>
+          </a:ln>
+        </p:spPr>
+        <p:style>
+          <a:lnRef idx="3">
+            <a:schemeClr val="accent2"/>
+          </a:lnRef>
+          <a:fillRef idx="0">
+            <a:schemeClr val="accent2"/>
+          </a:fillRef>
+          <a:effectRef idx="2">
+            <a:schemeClr val="accent2"/>
+          </a:effectRef>
+          <a:fontRef idx="minor">
+            <a:schemeClr val="tx1"/>
+          </a:fontRef>
+        </p:style>
+      </p:cxnSp>
+      <p:cxnSp>
+        <p:nvCxnSpPr>
+          <p:cNvPr id="20" name="Straight Arrow Connector 19"/>
+          <p:cNvCxnSpPr/>
+          <p:nvPr/>
+        </p:nvCxnSpPr>
+        <p:spPr>
+          <a:xfrm>
+            <a:off x="4634907" y="3850675"/>
+            <a:ext cx="921403" cy="435826"/>
+          </a:xfrm>
+          <a:prstGeom prst="straightConnector1">
+            <a:avLst/>
+          </a:prstGeom>
+          <a:ln>
+            <a:tailEnd type="arrow"/>
+          </a:ln>
+        </p:spPr>
+        <p:style>
+          <a:lnRef idx="3">
+            <a:schemeClr val="accent2"/>
+          </a:lnRef>
+          <a:fillRef idx="0">
+            <a:schemeClr val="accent2"/>
+          </a:fillRef>
+          <a:effectRef idx="2">
+            <a:schemeClr val="accent2"/>
+          </a:effectRef>
+          <a:fontRef idx="minor">
+            <a:schemeClr val="tx1"/>
+          </a:fontRef>
+        </p:style>
+      </p:cxnSp>
     </p:spTree>
     <p:extLst>
       <p:ext uri="{BB962C8B-B14F-4D97-AF65-F5344CB8AC3E}">
         <p14:creationId xmlns:p14="http://schemas.microsoft.com/office/powerpoint/2010/main" val="745019440"/>
+      </p:ext>
+    </p:extLst>
+  </p:cSld>
+  <p:clrMapOvr>
+    <a:masterClrMapping/>
+  </p:clrMapOvr>
+</p:sld>
+</file>
+
+<file path=ppt/slides/slide13.xml><?xml version="1.0" encoding="utf-8"?>
+<p:sld xmlns:a="http://schemas.openxmlformats.org/drawingml/2006/main" xmlns:r="http://schemas.openxmlformats.org/officeDocument/2006/relationships" xmlns:p="http://schemas.openxmlformats.org/presentationml/2006/main">
+  <p:cSld>
+    <p:spTree>
+      <p:nvGrpSpPr>
+        <p:cNvPr id="1" name=""/>
+        <p:cNvGrpSpPr/>
+        <p:nvPr/>
+      </p:nvGrpSpPr>
+      <p:grpSpPr>
+        <a:xfrm>
+          <a:off x="0" y="0"/>
+          <a:ext cx="0" cy="0"/>
+          <a:chOff x="0" y="0"/>
+          <a:chExt cx="0" cy="0"/>
+        </a:xfrm>
+      </p:grpSpPr>
+      <p:sp>
+        <p:nvSpPr>
+          <p:cNvPr id="3" name="Content Placeholder 2"/>
+          <p:cNvSpPr>
+            <a:spLocks noGrp="1"/>
+          </p:cNvSpPr>
+          <p:nvPr>
+            <p:ph idx="1"/>
+          </p:nvPr>
+        </p:nvSpPr>
+        <p:spPr/>
+        <p:txBody>
+          <a:bodyPr>
+            <a:normAutofit/>
+          </a:bodyPr>
+          <a:lstStyle/>
+          <a:p>
+            <a:pPr marL="0" indent="0" algn="ctr">
+              <a:buNone/>
+            </a:pPr>
+            <a:endParaRPr lang="en-US" sz="4800" dirty="0" smtClean="0"/>
+          </a:p>
+          <a:p>
+            <a:pPr marL="0" indent="0" algn="ctr">
+              <a:buNone/>
+            </a:pPr>
+            <a:r>
+              <a:rPr lang="en-US" sz="4800" dirty="0" smtClean="0"/>
+              <a:t>Can We </a:t>
+            </a:r>
+            <a:r>
+              <a:rPr lang="en-US" sz="4800" dirty="0"/>
+              <a:t>D</a:t>
+            </a:r>
+            <a:r>
+              <a:rPr lang="en-US" sz="4800" dirty="0" smtClean="0"/>
+              <a:t>o Better with </a:t>
+            </a:r>
+          </a:p>
+          <a:p>
+            <a:pPr marL="0" indent="0" algn="ctr">
+              <a:buNone/>
+            </a:pPr>
+            <a:r>
+              <a:rPr lang="en-US" sz="4800" dirty="0" smtClean="0"/>
+              <a:t>Neural Networks?</a:t>
+            </a:r>
+            <a:endParaRPr lang="en-US" sz="4800" dirty="0"/>
+          </a:p>
+        </p:txBody>
+      </p:sp>
+    </p:spTree>
+    <p:extLst>
+      <p:ext uri="{BB962C8B-B14F-4D97-AF65-F5344CB8AC3E}">
+        <p14:creationId xmlns:p14="http://schemas.microsoft.com/office/powerpoint/2010/main" val="2239602037"/>
+      </p:ext>
+    </p:extLst>
+  </p:cSld>
+  <p:clrMapOvr>
+    <a:masterClrMapping/>
+  </p:clrMapOvr>
+</p:sld>
+</file>
+
+<file path=ppt/slides/slide14.xml><?xml version="1.0" encoding="utf-8"?>
+<p:sld xmlns:a="http://schemas.openxmlformats.org/drawingml/2006/main" xmlns:r="http://schemas.openxmlformats.org/officeDocument/2006/relationships" xmlns:p="http://schemas.openxmlformats.org/presentationml/2006/main">
+  <p:cSld>
+    <p:spTree>
+      <p:nvGrpSpPr>
+        <p:cNvPr id="1" name=""/>
+        <p:cNvGrpSpPr/>
+        <p:nvPr/>
+      </p:nvGrpSpPr>
+      <p:grpSpPr>
+        <a:xfrm>
+          <a:off x="0" y="0"/>
+          <a:ext cx="0" cy="0"/>
+          <a:chOff x="0" y="0"/>
+          <a:chExt cx="0" cy="0"/>
+        </a:xfrm>
+      </p:grpSpPr>
+      <p:sp>
+        <p:nvSpPr>
+          <p:cNvPr id="2" name="Title 1"/>
+          <p:cNvSpPr>
+            <a:spLocks noGrp="1"/>
+          </p:cNvSpPr>
+          <p:nvPr>
+            <p:ph type="title"/>
+          </p:nvPr>
+        </p:nvSpPr>
+        <p:spPr/>
+        <p:txBody>
+          <a:bodyPr/>
+          <a:lstStyle/>
+          <a:p>
+            <a:r>
+              <a:rPr lang="en-US" dirty="0" smtClean="0"/>
+              <a:t>Feed Forward Neural Networks</a:t>
+            </a:r>
+            <a:endParaRPr lang="en-US" dirty="0"/>
+          </a:p>
+        </p:txBody>
+      </p:sp>
+      <p:pic>
+        <p:nvPicPr>
+          <p:cNvPr id="5" name="Picture 4"/>
+          <p:cNvPicPr>
+            <a:picLocks noChangeAspect="1"/>
+          </p:cNvPicPr>
+          <p:nvPr/>
+        </p:nvPicPr>
+        <p:blipFill>
+          <a:blip r:embed="rId3"/>
+          <a:stretch>
+            <a:fillRect/>
+          </a:stretch>
+        </p:blipFill>
+        <p:spPr>
+          <a:xfrm>
+            <a:off x="457199" y="1873345"/>
+            <a:ext cx="8277049" cy="3182212"/>
+          </a:xfrm>
+          <a:prstGeom prst="rect">
+            <a:avLst/>
+          </a:prstGeom>
+        </p:spPr>
+      </p:pic>
+      <p:sp>
+        <p:nvSpPr>
+          <p:cNvPr id="6" name="TextBox 5"/>
+          <p:cNvSpPr txBox="1"/>
+          <p:nvPr/>
+        </p:nvSpPr>
+        <p:spPr>
+          <a:xfrm>
+            <a:off x="859152" y="5491381"/>
+            <a:ext cx="7570454" cy="461665"/>
+          </a:xfrm>
+          <a:prstGeom prst="rect">
+            <a:avLst/>
+          </a:prstGeom>
+          <a:noFill/>
+        </p:spPr>
+        <p:txBody>
+          <a:bodyPr wrap="square" rtlCol="0">
+            <a:spAutoFit/>
+          </a:bodyPr>
+          <a:lstStyle/>
+          <a:p>
+            <a:r>
+              <a:rPr lang="en-US" sz="2400" dirty="0" smtClean="0"/>
+              <a:t>Used </a:t>
+            </a:r>
+            <a:r>
+              <a:rPr lang="en-US" sz="2400" dirty="0" err="1" smtClean="0"/>
+              <a:t>Nolearn</a:t>
+            </a:r>
+            <a:r>
+              <a:rPr lang="en-US" sz="2400" dirty="0" smtClean="0"/>
+              <a:t> to implement Feed Forward Neural Networks</a:t>
+            </a:r>
+            <a:endParaRPr lang="en-US" sz="2400" dirty="0"/>
+          </a:p>
+        </p:txBody>
+      </p:sp>
+    </p:spTree>
+    <p:extLst>
+      <p:ext uri="{BB962C8B-B14F-4D97-AF65-F5344CB8AC3E}">
+        <p14:creationId xmlns:p14="http://schemas.microsoft.com/office/powerpoint/2010/main" val="2256408447"/>
+      </p:ext>
+    </p:extLst>
+  </p:cSld>
+  <p:clrMapOvr>
+    <a:masterClrMapping/>
+  </p:clrMapOvr>
+</p:sld>
+</file>
+
+<file path=ppt/slides/slide15.xml><?xml version="1.0" encoding="utf-8"?>
+<p:sld xmlns:a="http://schemas.openxmlformats.org/drawingml/2006/main" xmlns:r="http://schemas.openxmlformats.org/officeDocument/2006/relationships" xmlns:p="http://schemas.openxmlformats.org/presentationml/2006/main">
+  <p:cSld>
+    <p:spTree>
+      <p:nvGrpSpPr>
+        <p:cNvPr id="1" name=""/>
+        <p:cNvGrpSpPr/>
+        <p:nvPr/>
+      </p:nvGrpSpPr>
+      <p:grpSpPr>
+        <a:xfrm>
+          <a:off x="0" y="0"/>
+          <a:ext cx="0" cy="0"/>
+          <a:chOff x="0" y="0"/>
+          <a:chExt cx="0" cy="0"/>
+        </a:xfrm>
+      </p:grpSpPr>
+      <p:sp>
+        <p:nvSpPr>
+          <p:cNvPr id="2" name="Title 1"/>
+          <p:cNvSpPr>
+            <a:spLocks noGrp="1"/>
+          </p:cNvSpPr>
+          <p:nvPr>
+            <p:ph type="title"/>
+          </p:nvPr>
+        </p:nvSpPr>
+        <p:spPr/>
+        <p:txBody>
+          <a:bodyPr/>
+          <a:lstStyle/>
+          <a:p>
+            <a:r>
+              <a:rPr lang="en-US" dirty="0" smtClean="0"/>
+              <a:t>Recurrent Neural Networks</a:t>
+            </a:r>
+            <a:endParaRPr lang="en-US" dirty="0"/>
+          </a:p>
+        </p:txBody>
+      </p:sp>
+      <p:pic>
+        <p:nvPicPr>
+          <p:cNvPr id="4" name="Picture 3"/>
+          <p:cNvPicPr>
+            <a:picLocks noChangeAspect="1"/>
+          </p:cNvPicPr>
+          <p:nvPr/>
+        </p:nvPicPr>
+        <p:blipFill>
+          <a:blip r:embed="rId2"/>
+          <a:stretch>
+            <a:fillRect/>
+          </a:stretch>
+        </p:blipFill>
+        <p:spPr>
+          <a:xfrm>
+            <a:off x="2032000" y="1621384"/>
+            <a:ext cx="5080000" cy="4038600"/>
+          </a:xfrm>
+          <a:prstGeom prst="rect">
+            <a:avLst/>
+          </a:prstGeom>
+        </p:spPr>
+      </p:pic>
+      <p:sp>
+        <p:nvSpPr>
+          <p:cNvPr id="5" name="TextBox 4"/>
+          <p:cNvSpPr txBox="1"/>
+          <p:nvPr/>
+        </p:nvSpPr>
+        <p:spPr>
+          <a:xfrm>
+            <a:off x="1021014" y="5815133"/>
+            <a:ext cx="7665785" cy="830997"/>
+          </a:xfrm>
+          <a:prstGeom prst="rect">
+            <a:avLst/>
+          </a:prstGeom>
+          <a:noFill/>
+        </p:spPr>
+        <p:txBody>
+          <a:bodyPr wrap="square" rtlCol="0">
+            <a:spAutoFit/>
+          </a:bodyPr>
+          <a:lstStyle/>
+          <a:p>
+            <a:pPr marL="342900" indent="-342900">
+              <a:buFont typeface="Arial"/>
+              <a:buChar char="•"/>
+            </a:pPr>
+            <a:r>
+              <a:rPr lang="en-US" sz="2400" dirty="0" smtClean="0"/>
+              <a:t>Used </a:t>
+            </a:r>
+            <a:r>
+              <a:rPr lang="en-US" sz="2400" dirty="0" err="1" smtClean="0"/>
+              <a:t>PyBrain</a:t>
+            </a:r>
+            <a:r>
+              <a:rPr lang="en-US" sz="2400" dirty="0" smtClean="0"/>
+              <a:t> to implement Recurrent Neural Networks</a:t>
+            </a:r>
+          </a:p>
+          <a:p>
+            <a:pPr marL="342900" indent="-342900">
+              <a:buFont typeface="Arial"/>
+              <a:buChar char="•"/>
+            </a:pPr>
+            <a:r>
+              <a:rPr lang="en-US" sz="2400" dirty="0" smtClean="0"/>
+              <a:t>Reputation for good performance with time series data</a:t>
+            </a:r>
+            <a:endParaRPr lang="en-US" sz="2400" dirty="0"/>
+          </a:p>
+        </p:txBody>
+      </p:sp>
+    </p:spTree>
+    <p:extLst>
+      <p:ext uri="{BB962C8B-B14F-4D97-AF65-F5344CB8AC3E}">
+        <p14:creationId xmlns:p14="http://schemas.microsoft.com/office/powerpoint/2010/main" val="2766872437"/>
       </p:ext>
     </p:extLst>
   </p:cSld>
@@ -3839,7 +4482,14 @@
           <a:p>
             <a:r>
               <a:rPr lang="en-US" dirty="0" smtClean="0"/>
-              <a:t>Can we do Better with Neural Networks / Deep Learning?</a:t>
+              <a:t>Neural Network Accuracies </a:t>
+            </a:r>
+            <a:br>
+              <a:rPr lang="en-US" dirty="0" smtClean="0"/>
+            </a:br>
+            <a:r>
+              <a:rPr lang="en-US" dirty="0" smtClean="0"/>
+              <a:t>for OIL prediction</a:t>
             </a:r>
             <a:endParaRPr lang="en-US" dirty="0"/>
           </a:p>
@@ -3857,17 +4507,56 @@
         </p:nvSpPr>
         <p:spPr/>
         <p:txBody>
-          <a:bodyPr/>
-          <a:lstStyle/>
-          <a:p>
-            <a:endParaRPr lang="en-US"/>
+          <a:bodyPr>
+            <a:normAutofit fontScale="85000" lnSpcReduction="20000"/>
+          </a:bodyPr>
+          <a:lstStyle/>
+          <a:p>
+            <a:r>
+              <a:rPr lang="en-US" dirty="0" smtClean="0"/>
+              <a:t>Implemented one, two, and three hidden layer Feed Forward Neural Networks with 200 through 800 nodes per layer</a:t>
+            </a:r>
+          </a:p>
+          <a:p>
+            <a:endParaRPr lang="en-US" dirty="0" smtClean="0"/>
+          </a:p>
+          <a:p>
+            <a:r>
+              <a:rPr lang="en-US" dirty="0" smtClean="0"/>
+              <a:t>84 different structures</a:t>
+            </a:r>
+          </a:p>
+          <a:p>
+            <a:endParaRPr lang="en-US" dirty="0" smtClean="0"/>
+          </a:p>
+          <a:p>
+            <a:r>
+              <a:rPr lang="en-US" dirty="0" smtClean="0"/>
+              <a:t>On average, they all performed about the same</a:t>
+            </a:r>
+          </a:p>
+          <a:p>
+            <a:endParaRPr lang="en-US" dirty="0" smtClean="0"/>
+          </a:p>
+          <a:p>
+            <a:r>
+              <a:rPr lang="en-US" dirty="0" smtClean="0"/>
+              <a:t>Highest accuracy was 54.48%.  </a:t>
+            </a:r>
+          </a:p>
+          <a:p>
+            <a:r>
+              <a:rPr lang="en-US" dirty="0" smtClean="0"/>
+              <a:t>Slight outperformance over Logistic Regression of 54.0%</a:t>
+            </a:r>
+            <a:endParaRPr lang="en-US" dirty="0"/>
           </a:p>
         </p:txBody>
       </p:sp>
     </p:spTree>
     <p:extLst>
       <p:ext uri="{BB962C8B-B14F-4D97-AF65-F5344CB8AC3E}">
-        <p14:creationId xmlns:p14="http://schemas.microsoft.com/office/powerpoint/2010/main" val="2239602037"/>
+        <p14:creationId xmlns:p14="http://schemas.microsoft.com/office/powerpoint/2010/main" val="967520603"/>
       </p:ext>
     </p:extLst>
   </p:cSld>
@@ -3913,7 +4602,7 @@
           <a:p>
             <a:r>
               <a:rPr lang="en-US" dirty="0" smtClean="0"/>
-              <a:t>Neural Network Accuracies for Different Markets</a:t>
+              <a:t>Neural Network* Accuracies for Different Markets</a:t>
             </a:r>
             <a:endParaRPr lang="en-US" dirty="0"/>
           </a:p>
@@ -3927,8 +4616,8 @@
         </p:nvSpPr>
         <p:spPr>
           <a:xfrm>
-            <a:off x="4445113" y="6456960"/>
-            <a:ext cx="5777451" cy="369332"/>
+            <a:off x="5690213" y="6332440"/>
+            <a:ext cx="3498885" cy="461665"/>
           </a:xfrm>
           <a:prstGeom prst="rect">
             <a:avLst/>
@@ -3942,16 +4631,16 @@
           <a:lstStyle/>
           <a:p>
             <a:r>
-              <a:rPr lang="en-US" dirty="0" smtClean="0"/>
-              <a:t>* Feed Forward: 2 Layers with 500 and 50 Nodes</a:t>
-            </a:r>
-            <a:endParaRPr lang="en-US" dirty="0"/>
+              <a:rPr lang="en-US" sz="2400" dirty="0" smtClean="0"/>
+              <a:t>* Feed Forward: 2 Layers</a:t>
+            </a:r>
+            <a:endParaRPr lang="en-US" sz="2400" dirty="0"/>
           </a:p>
         </p:txBody>
       </p:sp>
       <p:pic>
         <p:nvPicPr>
-          <p:cNvPr id="11" name="Picture 10"/>
+          <p:cNvPr id="14" name="Picture 13"/>
           <p:cNvPicPr>
             <a:picLocks noChangeAspect="1"/>
           </p:cNvPicPr>
@@ -3965,8 +4654,8 @@
         </p:blipFill>
         <p:spPr>
           <a:xfrm>
-            <a:off x="933497" y="1704034"/>
-            <a:ext cx="7178269" cy="4397498"/>
+            <a:off x="112477" y="1682749"/>
+            <a:ext cx="8727429" cy="3783727"/>
           </a:xfrm>
           <a:prstGeom prst="rect">
             <a:avLst/>
@@ -4055,15 +4744,7 @@
           <a:p>
             <a:r>
               <a:rPr lang="en-US" dirty="0" smtClean="0"/>
-              <a:t>Explain general observations for accuracy between </a:t>
-            </a:r>
-            <a:r>
-              <a:rPr lang="en-US" dirty="0" err="1" smtClean="0"/>
-              <a:t>feedforward</a:t>
-            </a:r>
-            <a:r>
-              <a:rPr lang="en-US" dirty="0" smtClean="0"/>
-              <a:t> vs. recurrent neural networks</a:t>
+              <a:t>Explain general observations for accuracy between Feed Forward vs. recurrent neural networks</a:t>
             </a:r>
             <a:endParaRPr lang="en-US" dirty="0"/>
           </a:p>
@@ -4073,6 +4754,133 @@
     <p:extLst>
       <p:ext uri="{BB962C8B-B14F-4D97-AF65-F5344CB8AC3E}">
         <p14:creationId xmlns:p14="http://schemas.microsoft.com/office/powerpoint/2010/main" val="4112148529"/>
+      </p:ext>
+    </p:extLst>
+  </p:cSld>
+  <p:clrMapOvr>
+    <a:masterClrMapping/>
+  </p:clrMapOvr>
+</p:sld>
+</file>
+
+<file path=ppt/slides/slide19.xml><?xml version="1.0" encoding="utf-8"?>
+<p:sld xmlns:a="http://schemas.openxmlformats.org/drawingml/2006/main" xmlns:r="http://schemas.openxmlformats.org/officeDocument/2006/relationships" xmlns:p="http://schemas.openxmlformats.org/presentationml/2006/main">
+  <p:cSld>
+    <p:spTree>
+      <p:nvGrpSpPr>
+        <p:cNvPr id="1" name=""/>
+        <p:cNvGrpSpPr/>
+        <p:nvPr/>
+      </p:nvGrpSpPr>
+      <p:grpSpPr>
+        <a:xfrm>
+          <a:off x="0" y="0"/>
+          <a:ext cx="0" cy="0"/>
+          <a:chOff x="0" y="0"/>
+          <a:chExt cx="0" cy="0"/>
+        </a:xfrm>
+      </p:grpSpPr>
+      <p:sp>
+        <p:nvSpPr>
+          <p:cNvPr id="2" name="Title 1"/>
+          <p:cNvSpPr>
+            <a:spLocks noGrp="1"/>
+          </p:cNvSpPr>
+          <p:nvPr>
+            <p:ph type="title"/>
+          </p:nvPr>
+        </p:nvSpPr>
+        <p:spPr/>
+        <p:txBody>
+          <a:bodyPr/>
+          <a:lstStyle/>
+          <a:p>
+            <a:r>
+              <a:rPr lang="en-US" dirty="0" smtClean="0"/>
+              <a:t>Add to presentation</a:t>
+            </a:r>
+            <a:endParaRPr lang="en-US" dirty="0"/>
+          </a:p>
+        </p:txBody>
+      </p:sp>
+      <p:sp>
+        <p:nvSpPr>
+          <p:cNvPr id="3" name="Content Placeholder 2"/>
+          <p:cNvSpPr>
+            <a:spLocks noGrp="1"/>
+          </p:cNvSpPr>
+          <p:nvPr>
+            <p:ph idx="1"/>
+          </p:nvPr>
+        </p:nvSpPr>
+        <p:spPr/>
+        <p:txBody>
+          <a:bodyPr>
+            <a:normAutofit/>
+          </a:bodyPr>
+          <a:lstStyle/>
+          <a:p>
+            <a:r>
+              <a:rPr lang="en-US" dirty="0" err="1" smtClean="0"/>
+              <a:t>Heatmap</a:t>
+            </a:r>
+            <a:r>
+              <a:rPr lang="en-US" dirty="0" smtClean="0"/>
+              <a:t> of accuracy of different models</a:t>
+            </a:r>
+          </a:p>
+          <a:p>
+            <a:r>
+              <a:rPr lang="en-US" dirty="0" smtClean="0"/>
+              <a:t>Put nice background on title like </a:t>
+            </a:r>
+            <a:r>
+              <a:rPr lang="en-US" dirty="0" err="1" smtClean="0"/>
+              <a:t>alison</a:t>
+            </a:r>
+            <a:r>
+              <a:rPr lang="en-US" dirty="0" smtClean="0"/>
+              <a:t> </a:t>
+            </a:r>
+            <a:r>
+              <a:rPr lang="en-US" dirty="0" err="1" smtClean="0"/>
+              <a:t>cossette</a:t>
+            </a:r>
+            <a:endParaRPr lang="en-US" dirty="0" smtClean="0"/>
+          </a:p>
+          <a:p>
+            <a:r>
+              <a:rPr lang="en-US" dirty="0" smtClean="0"/>
+              <a:t>Interpretation of weights?</a:t>
+            </a:r>
+          </a:p>
+          <a:p>
+            <a:r>
+              <a:rPr lang="en-US" dirty="0" smtClean="0"/>
+              <a:t>Use different activation functions</a:t>
+            </a:r>
+          </a:p>
+          <a:p>
+            <a:r>
+              <a:rPr lang="en-US" dirty="0" smtClean="0"/>
+              <a:t>Feature importance: try adding noise to each feature and see what happens to accuracy</a:t>
+            </a:r>
+          </a:p>
+          <a:p>
+            <a:pPr marL="0" indent="0">
+              <a:buNone/>
+            </a:pPr>
+            <a:endParaRPr lang="en-US" dirty="0" smtClean="0"/>
+          </a:p>
+          <a:p>
+            <a:endParaRPr lang="en-US" dirty="0"/>
+          </a:p>
+        </p:txBody>
+      </p:sp>
+    </p:spTree>
+    <p:extLst>
+      <p:ext uri="{BB962C8B-B14F-4D97-AF65-F5344CB8AC3E}">
+        <p14:creationId xmlns:p14="http://schemas.microsoft.com/office/powerpoint/2010/main" val="4167259632"/>
       </p:ext>
     </p:extLst>
   </p:cSld>
@@ -4152,8 +4960,12 @@
           <a:p>
             <a:pPr lvl="1"/>
             <a:r>
-              <a:rPr lang="en-US" dirty="0" smtClean="0"/>
-              <a:t>Markets are susceptible to human emotions such as overreaction to news</a:t>
+              <a:rPr lang="en-US" dirty="0"/>
+              <a:t>H</a:t>
+            </a:r>
+            <a:r>
+              <a:rPr lang="en-US" dirty="0" smtClean="0"/>
+              <a:t>uman psychology affects markets</a:t>
             </a:r>
           </a:p>
           <a:p>
@@ -4171,14 +4983,9 @@
             </a:r>
           </a:p>
           <a:p>
-            <a:pPr lvl="1"/>
-            <a:r>
-              <a:rPr lang="en-US" dirty="0" smtClean="0"/>
-              <a:t>Discovered patterns disappear</a:t>
-            </a:r>
-          </a:p>
-          <a:p>
-            <a:pPr lvl="1"/>
+            <a:pPr marL="457200" lvl="1" indent="0">
+              <a:buNone/>
+            </a:pPr>
             <a:endParaRPr lang="en-US" dirty="0" smtClean="0"/>
           </a:p>
           <a:p>
@@ -4256,7 +5063,7 @@
           <a:p>
             <a:r>
               <a:rPr lang="en-US" dirty="0" smtClean="0"/>
-              <a:t>Use computer algorithms to make investing decisions</a:t>
+              <a:t>Use computer algorithms to make trading decisions</a:t>
             </a:r>
             <a:endParaRPr lang="en-US" dirty="0"/>
           </a:p>
@@ -4357,7 +5164,7 @@
           <a:p>
             <a:r>
               <a:rPr lang="en-US" dirty="0" smtClean="0"/>
-              <a:t>Overview</a:t>
+              <a:t>Goal</a:t>
             </a:r>
             <a:endParaRPr lang="en-US" dirty="0"/>
           </a:p>
@@ -4381,60 +5188,48 @@
         </p:spPr>
         <p:txBody>
           <a:bodyPr>
-            <a:normAutofit fontScale="92500" lnSpcReduction="10000"/>
+            <a:normAutofit lnSpcReduction="10000"/>
           </a:bodyPr>
           <a:lstStyle/>
           <a:p>
-            <a:r>
-              <a:rPr lang="en-US" dirty="0" smtClean="0"/>
-              <a:t>Goal</a:t>
-            </a:r>
-          </a:p>
-          <a:p>
             <a:pPr lvl="1"/>
             <a:r>
               <a:rPr lang="en-US" dirty="0" smtClean="0"/>
-              <a:t>Overcome these difficulties by using computers to assess a lot of economic data when released by the source</a:t>
-            </a:r>
+              <a:t>Predict the next day’s market direction using a macroeconomic and financial time series data</a:t>
+            </a:r>
+          </a:p>
+          <a:p>
+            <a:pPr lvl="1"/>
             <a:endParaRPr lang="en-US" dirty="0" smtClean="0"/>
           </a:p>
           <a:p>
-            <a:pPr marL="0" indent="0">
-              <a:buNone/>
-            </a:pPr>
+            <a:pPr lvl="1"/>
+            <a:r>
+              <a:rPr lang="en-US" dirty="0" smtClean="0"/>
+              <a:t>To find the most predictable financial market using standard supervised learning algorithms</a:t>
+            </a:r>
+          </a:p>
+          <a:p>
+            <a:pPr lvl="1"/>
             <a:endParaRPr lang="en-US" dirty="0" smtClean="0"/>
           </a:p>
           <a:p>
             <a:pPr lvl="1"/>
             <a:r>
               <a:rPr lang="en-US" dirty="0" smtClean="0"/>
-              <a:t>Predict the next day’s market direction using macroeconomic and financial time series data</a:t>
+              <a:t>Calculate the accuracy of best performing algorithm</a:t>
             </a:r>
           </a:p>
           <a:p>
             <a:pPr lvl="1"/>
-            <a:r>
-              <a:rPr lang="en-US" dirty="0" smtClean="0"/>
-              <a:t>Compare the accuracy of different neural networks /deep learning structures</a:t>
-            </a:r>
+            <a:endParaRPr lang="en-US" dirty="0" smtClean="0"/>
           </a:p>
           <a:p>
             <a:pPr lvl="1"/>
             <a:r>
               <a:rPr lang="en-US" dirty="0" smtClean="0"/>
-              <a:t>To find the most inefficient or predictable financial market</a:t>
-            </a:r>
-          </a:p>
-          <a:p>
-            <a:pPr marL="457200" lvl="1" indent="0">
-              <a:buNone/>
-            </a:pPr>
-            <a:endParaRPr lang="en-US" dirty="0"/>
-          </a:p>
-          <a:p>
-            <a:pPr marL="457200" lvl="1" indent="0">
-              <a:buNone/>
-            </a:pPr>
+              <a:t>See if neural networks can outperform</a:t>
+            </a:r>
             <a:endParaRPr lang="en-US" dirty="0" smtClean="0"/>
           </a:p>
         </p:txBody>
@@ -4486,7 +5281,7 @@
           <a:p>
             <a:r>
               <a:rPr lang="en-US" dirty="0" smtClean="0"/>
-              <a:t>Data Source and Issues</a:t>
+              <a:t>Data</a:t>
             </a:r>
             <a:endParaRPr lang="en-US" dirty="0"/>
           </a:p>
@@ -4504,7 +5299,7 @@
         </p:nvSpPr>
         <p:spPr>
           <a:xfrm>
-            <a:off x="457199" y="1562844"/>
+            <a:off x="457199" y="1376064"/>
             <a:ext cx="8420651" cy="4999418"/>
           </a:xfrm>
         </p:spPr>
@@ -4515,61 +5310,77 @@
           <a:lstStyle/>
           <a:p>
             <a:r>
-              <a:rPr lang="en-US" sz="2400" dirty="0" smtClean="0"/>
-              <a:t>~ 2,500 financial and macroeconomic time series from the St. Louis Fed’s FRED database</a:t>
-            </a:r>
-          </a:p>
-          <a:p>
-            <a:endParaRPr lang="en-US" sz="2400" dirty="0" smtClean="0"/>
-          </a:p>
-          <a:p>
-            <a:r>
-              <a:rPr lang="en-US" sz="2400" dirty="0" smtClean="0"/>
-              <a:t>Data Issues:</a:t>
+              <a:rPr lang="en-US" sz="2200" dirty="0" smtClean="0"/>
+              <a:t>Market Prices</a:t>
+            </a:r>
+          </a:p>
+          <a:p>
+            <a:pPr lvl="2"/>
+            <a:r>
+              <a:rPr lang="en-US" sz="2200" dirty="0" smtClean="0"/>
+              <a:t>US Treasury Yields</a:t>
+            </a:r>
+          </a:p>
+          <a:p>
+            <a:pPr lvl="2"/>
+            <a:r>
+              <a:rPr lang="en-US" sz="2200" dirty="0" smtClean="0"/>
+              <a:t>S&amp;P 500</a:t>
+            </a:r>
+          </a:p>
+          <a:p>
+            <a:pPr lvl="2"/>
+            <a:r>
+              <a:rPr lang="en-US" sz="2200" dirty="0" smtClean="0"/>
+              <a:t>GLD</a:t>
+            </a:r>
+          </a:p>
+          <a:p>
+            <a:pPr lvl="2"/>
+            <a:r>
+              <a:rPr lang="en-US" sz="2200" dirty="0" smtClean="0"/>
+              <a:t>OIL</a:t>
             </a:r>
           </a:p>
           <a:p>
             <a:pPr lvl="1"/>
             <a:r>
-              <a:rPr lang="en-US" sz="2400" dirty="0" smtClean="0"/>
-              <a:t>Inconsistent starting dates</a:t>
+              <a:rPr lang="en-US" sz="2200" dirty="0" err="1" smtClean="0"/>
+              <a:t>Yahoofinance</a:t>
+            </a:r>
+            <a:endParaRPr lang="en-US" sz="2200" dirty="0" smtClean="0"/>
+          </a:p>
+          <a:p>
+            <a:endParaRPr lang="en-US" sz="2200" dirty="0" smtClean="0"/>
+          </a:p>
+          <a:p>
+            <a:r>
+              <a:rPr lang="en-US" sz="2200" dirty="0" smtClean="0"/>
+              <a:t>Features</a:t>
             </a:r>
           </a:p>
           <a:p>
             <a:pPr lvl="1"/>
             <a:r>
-              <a:rPr lang="en-US" sz="2400" dirty="0" smtClean="0"/>
-              <a:t>Inconsistent frequency </a:t>
+              <a:rPr lang="en-US" sz="2200" dirty="0" smtClean="0"/>
+              <a:t>500 daily financial and macroeconomic time series</a:t>
             </a:r>
           </a:p>
           <a:p>
             <a:pPr lvl="1"/>
             <a:r>
-              <a:rPr lang="en-US" sz="2400" dirty="0" smtClean="0"/>
-              <a:t>Inconsistent release day of week for weekly data</a:t>
-            </a:r>
-          </a:p>
-          <a:p>
-            <a:pPr lvl="1"/>
-            <a:r>
-              <a:rPr lang="en-US" sz="2400" dirty="0" smtClean="0"/>
-              <a:t>Timestamps of weekly data was not date of release but last date of data coverage</a:t>
-            </a:r>
-          </a:p>
-          <a:p>
-            <a:endParaRPr lang="en-US" sz="2400" dirty="0" smtClean="0"/>
-          </a:p>
-          <a:p>
-            <a:pPr marL="457200" lvl="1" indent="0">
-              <a:buNone/>
-            </a:pPr>
-            <a:endParaRPr lang="en-US" sz="2400" dirty="0" smtClean="0"/>
-          </a:p>
-          <a:p>
-            <a:pPr marL="0" indent="0">
-              <a:buNone/>
-            </a:pPr>
-            <a:endParaRPr lang="en-US" sz="2400" dirty="0"/>
+              <a:rPr lang="en-US" sz="2200" dirty="0" smtClean="0"/>
+              <a:t>St. Louis Fed’s FRED database</a:t>
+            </a:r>
+          </a:p>
+          <a:p>
+            <a:endParaRPr lang="en-US" sz="2200" dirty="0" smtClean="0"/>
+          </a:p>
+          <a:p>
+            <a:r>
+              <a:rPr lang="en-US" sz="2200" dirty="0" smtClean="0"/>
+              <a:t>10 years of data: 2006 – Present</a:t>
+            </a:r>
           </a:p>
         </p:txBody>
       </p:sp>
@@ -4618,7 +5429,11 @@
           <a:bodyPr/>
           <a:lstStyle/>
           <a:p>
-            <a:endParaRPr lang="en-US"/>
+            <a:r>
+              <a:rPr lang="en-US" dirty="0" smtClean="0"/>
+              <a:t>Data Issues and Preprocessing	</a:t>
+            </a:r>
+            <a:endParaRPr lang="en-US" dirty="0"/>
           </a:p>
         </p:txBody>
       </p:sp>
@@ -4632,53 +5447,78 @@
             <p:ph idx="1"/>
           </p:nvPr>
         </p:nvSpPr>
-        <p:spPr/>
-        <p:txBody>
-          <a:bodyPr/>
-          <a:lstStyle/>
-          <a:p>
-            <a:r>
-              <a:rPr lang="en-US" dirty="0" smtClean="0"/>
-              <a:t>Markets to Predict</a:t>
-            </a:r>
-          </a:p>
-          <a:p>
-            <a:pPr lvl="2"/>
-            <a:r>
-              <a:rPr lang="en-US" sz="2800" dirty="0" smtClean="0"/>
-              <a:t>S&amp;P 500</a:t>
-            </a:r>
-          </a:p>
-          <a:p>
-            <a:pPr lvl="2"/>
-            <a:r>
-              <a:rPr lang="en-US" sz="2800" dirty="0" smtClean="0"/>
-              <a:t>Gold</a:t>
-            </a:r>
-          </a:p>
-          <a:p>
-            <a:pPr lvl="2"/>
-            <a:r>
-              <a:rPr lang="en-US" sz="2800" dirty="0" smtClean="0"/>
-              <a:t>Oil</a:t>
-            </a:r>
-          </a:p>
-          <a:p>
-            <a:pPr lvl="2"/>
-            <a:r>
-              <a:rPr lang="en-US" sz="2800" dirty="0" smtClean="0"/>
-              <a:t>US Treasury Yields</a:t>
-            </a:r>
-          </a:p>
-          <a:p>
-            <a:endParaRPr lang="en-US" dirty="0"/>
+        <p:spPr>
+          <a:xfrm>
+            <a:off x="457200" y="1525488"/>
+            <a:ext cx="8229600" cy="4525963"/>
+          </a:xfrm>
+        </p:spPr>
+        <p:txBody>
+          <a:bodyPr>
+            <a:noAutofit/>
+          </a:bodyPr>
+          <a:lstStyle/>
+          <a:p>
+            <a:r>
+              <a:rPr lang="en-US" sz="2400" dirty="0" smtClean="0"/>
+              <a:t>Avoid Look-Ahead Bias:</a:t>
+            </a:r>
+          </a:p>
+          <a:p>
+            <a:pPr lvl="1"/>
+            <a:r>
+              <a:rPr lang="en-US" sz="2400" dirty="0" smtClean="0"/>
+              <a:t>Shifted market movement by 1 day to predict market movement by day </a:t>
+            </a:r>
+            <a:r>
+              <a:rPr lang="en-US" sz="2400" dirty="0" err="1" smtClean="0"/>
+              <a:t>before’s</a:t>
+            </a:r>
+            <a:r>
+              <a:rPr lang="en-US" sz="2400" dirty="0" smtClean="0"/>
+              <a:t> feature movements</a:t>
+            </a:r>
+          </a:p>
+          <a:p>
+            <a:pPr lvl="1"/>
+            <a:endParaRPr lang="en-US" sz="2400" dirty="0" smtClean="0"/>
+          </a:p>
+          <a:p>
+            <a:r>
+              <a:rPr lang="en-US" sz="2400" dirty="0" smtClean="0"/>
+              <a:t>Trained on various rolling windows and tested on next one day only</a:t>
+            </a:r>
+          </a:p>
+          <a:p>
+            <a:pPr lvl="1"/>
+            <a:r>
+              <a:rPr lang="en-US" sz="2400" dirty="0" smtClean="0"/>
+              <a:t>mimics a trading strategy that updates model on a daily basis to make trading decision for the next day</a:t>
+            </a:r>
+          </a:p>
+          <a:p>
+            <a:pPr lvl="1"/>
+            <a:endParaRPr lang="en-US" sz="2400" dirty="0" smtClean="0"/>
+          </a:p>
+          <a:p>
+            <a:r>
+              <a:rPr lang="en-US" sz="2400" dirty="0" smtClean="0"/>
+              <a:t>Standardized data</a:t>
+            </a:r>
+          </a:p>
+          <a:p>
+            <a:pPr lvl="1"/>
+            <a:r>
+              <a:rPr lang="en-US" sz="2400" dirty="0" smtClean="0"/>
+              <a:t>Subtracting mean and dividing by standard deviation</a:t>
+            </a:r>
           </a:p>
         </p:txBody>
       </p:sp>
     </p:spTree>
     <p:extLst>
       <p:ext uri="{BB962C8B-B14F-4D97-AF65-F5344CB8AC3E}">
-        <p14:creationId xmlns:p14="http://schemas.microsoft.com/office/powerpoint/2010/main" val="3666866449"/>
+        <p14:creationId xmlns:p14="http://schemas.microsoft.com/office/powerpoint/2010/main" val="2575996347"/>
       </p:ext>
     </p:extLst>
   </p:cSld>
@@ -4722,60 +5562,46 @@
           <a:p>
             <a:r>
               <a:rPr lang="en-US" dirty="0" smtClean="0"/>
-              <a:t>Methodology</a:t>
+              <a:t>Training and Testing Methodology</a:t>
             </a:r>
             <a:endParaRPr lang="en-US" dirty="0"/>
           </a:p>
         </p:txBody>
       </p:sp>
-      <p:sp>
-        <p:nvSpPr>
-          <p:cNvPr id="3" name="Content Placeholder 2"/>
-          <p:cNvSpPr>
-            <a:spLocks noGrp="1"/>
-          </p:cNvSpPr>
-          <p:nvPr>
-            <p:ph idx="1"/>
-          </p:nvPr>
-        </p:nvSpPr>
-        <p:spPr/>
-        <p:txBody>
-          <a:bodyPr/>
-          <a:lstStyle/>
-          <a:p>
-            <a:r>
-              <a:rPr lang="en-US" dirty="0" smtClean="0"/>
-              <a:t>Find the market that is most predictable using standard classification algorithms</a:t>
-            </a:r>
-          </a:p>
-          <a:p>
-            <a:endParaRPr lang="en-US" dirty="0" smtClean="0"/>
-          </a:p>
-          <a:p>
-            <a:r>
-              <a:rPr lang="en-US" dirty="0" smtClean="0"/>
-              <a:t>Calculate accuracy of best performing algorithm on most predictable market</a:t>
-            </a:r>
-          </a:p>
-          <a:p>
-            <a:pPr marL="0" indent="0">
-              <a:buNone/>
-            </a:pPr>
-            <a:endParaRPr lang="en-US" dirty="0" smtClean="0"/>
-          </a:p>
-          <a:p>
-            <a:r>
-              <a:rPr lang="en-US" dirty="0" smtClean="0"/>
-              <a:t>Compare to accuracy of using various forms of neural nets</a:t>
-            </a:r>
-            <a:endParaRPr lang="en-US" dirty="0"/>
-          </a:p>
-        </p:txBody>
-      </p:sp>
+      <p:pic>
+        <p:nvPicPr>
+          <p:cNvPr id="4" name="Picture 3" descr="chart.pdf"/>
+          <p:cNvPicPr>
+            <a:picLocks noChangeAspect="1"/>
+          </p:cNvPicPr>
+          <p:nvPr/>
+        </p:nvPicPr>
+        <p:blipFill>
+          <a:blip r:embed="rId2">
+            <a:extLst>
+              <a:ext uri="{28A0092B-C50C-407E-A947-70E740481C1C}">
+                <a14:useLocalDpi xmlns:a14="http://schemas.microsoft.com/office/drawing/2010/main" val="0"/>
+              </a:ext>
+            </a:extLst>
+          </a:blip>
+          <a:stretch>
+            <a:fillRect/>
+          </a:stretch>
+        </p:blipFill>
+        <p:spPr>
+          <a:xfrm>
+            <a:off x="863600" y="-720353"/>
+            <a:ext cx="8280400" cy="9681919"/>
+          </a:xfrm>
+          <a:prstGeom prst="rect">
+            <a:avLst/>
+          </a:prstGeom>
+        </p:spPr>
+      </p:pic>
     </p:spTree>
     <p:extLst>
       <p:ext uri="{BB962C8B-B14F-4D97-AF65-F5344CB8AC3E}">
-        <p14:creationId xmlns:p14="http://schemas.microsoft.com/office/powerpoint/2010/main" val="668456166"/>
+        <p14:creationId xmlns:p14="http://schemas.microsoft.com/office/powerpoint/2010/main" val="3955308608"/>
       </p:ext>
     </p:extLst>
   </p:cSld>
@@ -4819,7 +5645,7 @@
           <a:p>
             <a:r>
               <a:rPr lang="en-US" dirty="0" smtClean="0"/>
-              <a:t>Data Preprocessing	</a:t>
+              <a:t>Methodology</a:t>
             </a:r>
             <a:endParaRPr lang="en-US" dirty="0"/>
           </a:p>
@@ -4837,90 +5663,34 @@
         </p:nvSpPr>
         <p:spPr/>
         <p:txBody>
-          <a:bodyPr>
-            <a:normAutofit fontScale="92500" lnSpcReduction="20000"/>
-          </a:bodyPr>
-          <a:lstStyle/>
-          <a:p>
-            <a:r>
-              <a:rPr lang="en-US" dirty="0" smtClean="0"/>
-              <a:t>Market prices from </a:t>
-            </a:r>
-            <a:r>
-              <a:rPr lang="en-US" dirty="0" err="1" smtClean="0"/>
-              <a:t>Yahoofinance</a:t>
-            </a:r>
+          <a:bodyPr/>
+          <a:lstStyle/>
+          <a:p>
+            <a:r>
+              <a:rPr lang="en-US" dirty="0" smtClean="0"/>
+              <a:t>Find the market that is most predictable using standard classification algorithms</a:t>
+            </a:r>
+          </a:p>
+          <a:p>
             <a:endParaRPr lang="en-US" dirty="0" smtClean="0"/>
           </a:p>
           <a:p>
             <a:r>
               <a:rPr lang="en-US" dirty="0" smtClean="0"/>
-              <a:t>Used pandas</a:t>
-            </a:r>
-          </a:p>
-          <a:p>
-            <a:r>
-              <a:rPr lang="en-US" dirty="0" smtClean="0"/>
-              <a:t>Calculated daily differences</a:t>
-            </a:r>
-          </a:p>
-          <a:p>
-            <a:r>
-              <a:rPr lang="en-US" dirty="0" smtClean="0"/>
-              <a:t>Standardized data</a:t>
-            </a:r>
-          </a:p>
-          <a:p>
-            <a:r>
-              <a:rPr lang="en-US" dirty="0" smtClean="0"/>
-              <a:t>Rolling training with one day prediction</a:t>
-            </a:r>
-          </a:p>
-          <a:p>
+              <a:t>Calculate accuracy of best performing algorithm on most predictable market</a:t>
+            </a:r>
+          </a:p>
+          <a:p>
+            <a:pPr marL="0" indent="0">
+              <a:buNone/>
+            </a:pPr>
             <a:endParaRPr lang="en-US" dirty="0" smtClean="0"/>
           </a:p>
           <a:p>
-            <a:endParaRPr lang="en-US" sz="2000" dirty="0"/>
-          </a:p>
-          <a:p>
-            <a:r>
-              <a:rPr lang="en-US" sz="2000" dirty="0" smtClean="0"/>
-              <a:t>Solutions:</a:t>
-            </a:r>
-          </a:p>
-          <a:p>
-            <a:pPr lvl="1"/>
-            <a:r>
-              <a:rPr lang="en-US" sz="2000" dirty="0" smtClean="0"/>
-              <a:t>Used daily data only</a:t>
-            </a:r>
-          </a:p>
-          <a:p>
-            <a:pPr lvl="1"/>
-            <a:r>
-              <a:rPr lang="en-US" sz="2000" dirty="0" smtClean="0"/>
-              <a:t>Cut out data prior to a start date of the feature with the latest start date</a:t>
-            </a:r>
-          </a:p>
-          <a:p>
-            <a:pPr marL="457200" lvl="1" indent="0">
-              <a:buNone/>
-            </a:pPr>
-            <a:endParaRPr lang="en-US" sz="2000" dirty="0" smtClean="0"/>
-          </a:p>
-          <a:p>
-            <a:pPr marL="457200" lvl="1" indent="0">
-              <a:buNone/>
-            </a:pPr>
-            <a:r>
-              <a:rPr lang="en-US" sz="2000" dirty="0" smtClean="0"/>
-              <a:t>Only 500 features remained to be used</a:t>
-            </a:r>
-          </a:p>
-          <a:p>
-            <a:endParaRPr lang="en-US" dirty="0" smtClean="0"/>
-          </a:p>
-          <a:p>
+            <a:r>
+              <a:rPr lang="en-US" dirty="0" smtClean="0"/>
+              <a:t>Compare to accuracy of using various forms of neural nets</a:t>
+            </a:r>
             <a:endParaRPr lang="en-US" dirty="0"/>
           </a:p>
         </p:txBody>
@@ -4928,7 +5698,7 @@
     </p:spTree>
     <p:extLst>
       <p:ext uri="{BB962C8B-B14F-4D97-AF65-F5344CB8AC3E}">
-        <p14:creationId xmlns:p14="http://schemas.microsoft.com/office/powerpoint/2010/main" val="2575996347"/>
+        <p14:creationId xmlns:p14="http://schemas.microsoft.com/office/powerpoint/2010/main" val="668456166"/>
       </p:ext>
     </p:extLst>
   </p:cSld>
@@ -4965,97 +5735,61 @@
             <p:ph type="title"/>
           </p:nvPr>
         </p:nvSpPr>
-        <p:spPr/>
-        <p:txBody>
-          <a:bodyPr/>
-          <a:lstStyle/>
-          <a:p>
-            <a:r>
-              <a:rPr lang="en-US" dirty="0" smtClean="0"/>
-              <a:t>Add to presentation</a:t>
+        <p:spPr>
+          <a:xfrm>
+            <a:off x="457200" y="199926"/>
+            <a:ext cx="8229600" cy="1143000"/>
+          </a:xfrm>
+        </p:spPr>
+        <p:txBody>
+          <a:bodyPr>
+            <a:normAutofit fontScale="90000"/>
+          </a:bodyPr>
+          <a:lstStyle/>
+          <a:p>
+            <a:r>
+              <a:rPr lang="en-US" dirty="0" smtClean="0"/>
+              <a:t>Supervised Learning </a:t>
+            </a:r>
+            <a:br>
+              <a:rPr lang="en-US" dirty="0" smtClean="0"/>
+            </a:br>
+            <a:r>
+              <a:rPr lang="en-US" dirty="0" smtClean="0"/>
+              <a:t>Prediction Accuracies</a:t>
             </a:r>
             <a:endParaRPr lang="en-US" dirty="0"/>
           </a:p>
         </p:txBody>
       </p:sp>
-      <p:sp>
-        <p:nvSpPr>
-          <p:cNvPr id="3" name="Content Placeholder 2"/>
-          <p:cNvSpPr>
-            <a:spLocks noGrp="1"/>
-          </p:cNvSpPr>
-          <p:nvPr>
-            <p:ph idx="1"/>
-          </p:nvPr>
-        </p:nvSpPr>
-        <p:spPr/>
-        <p:txBody>
-          <a:bodyPr>
-            <a:normAutofit/>
-          </a:bodyPr>
-          <a:lstStyle/>
-          <a:p>
-            <a:r>
-              <a:rPr lang="en-US" dirty="0" err="1" smtClean="0"/>
-              <a:t>Heatmap</a:t>
-            </a:r>
-            <a:r>
-              <a:rPr lang="en-US" dirty="0" smtClean="0"/>
-              <a:t> of accuracy of different models</a:t>
-            </a:r>
-          </a:p>
-          <a:p>
-            <a:r>
-              <a:rPr lang="en-US" dirty="0" smtClean="0"/>
-              <a:t>Put nice background on title like </a:t>
-            </a:r>
-            <a:r>
-              <a:rPr lang="en-US" dirty="0" err="1" smtClean="0"/>
-              <a:t>alison</a:t>
-            </a:r>
-            <a:r>
-              <a:rPr lang="en-US" dirty="0" smtClean="0"/>
-              <a:t> </a:t>
-            </a:r>
-            <a:r>
-              <a:rPr lang="en-US" dirty="0" err="1" smtClean="0"/>
-              <a:t>cossette</a:t>
-            </a:r>
-            <a:endParaRPr lang="en-US" dirty="0" smtClean="0"/>
-          </a:p>
-          <a:p>
-            <a:r>
-              <a:rPr lang="en-US" dirty="0" smtClean="0"/>
-              <a:t>Interpretation of weights?</a:t>
-            </a:r>
-          </a:p>
-          <a:p>
-            <a:r>
-              <a:rPr lang="en-US" dirty="0" smtClean="0"/>
-              <a:t>Use different activation functions</a:t>
-            </a:r>
-          </a:p>
-          <a:p>
-            <a:r>
-              <a:rPr lang="en-US" dirty="0" smtClean="0"/>
-              <a:t>Feature importance: try adding noise to each feature and see what happens to accuracy</a:t>
-            </a:r>
-          </a:p>
-          <a:p>
-            <a:pPr marL="0" indent="0">
-              <a:buNone/>
-            </a:pPr>
-            <a:endParaRPr lang="en-US" dirty="0" smtClean="0"/>
-          </a:p>
-          <a:p>
-            <a:endParaRPr lang="en-US" dirty="0"/>
-          </a:p>
-        </p:txBody>
-      </p:sp>
+      <p:pic>
+        <p:nvPicPr>
+          <p:cNvPr id="7" name="Picture 6"/>
+          <p:cNvPicPr>
+            <a:picLocks noChangeAspect="1"/>
+          </p:cNvPicPr>
+          <p:nvPr/>
+        </p:nvPicPr>
+        <p:blipFill>
+          <a:blip r:embed="rId2"/>
+          <a:stretch>
+            <a:fillRect/>
+          </a:stretch>
+        </p:blipFill>
+        <p:spPr>
+          <a:xfrm>
+            <a:off x="357592" y="1394027"/>
+            <a:ext cx="8229600" cy="5198440"/>
+          </a:xfrm>
+          <a:prstGeom prst="rect">
+            <a:avLst/>
+          </a:prstGeom>
+        </p:spPr>
+      </p:pic>
     </p:spTree>
     <p:extLst>
       <p:ext uri="{BB962C8B-B14F-4D97-AF65-F5344CB8AC3E}">
-        <p14:creationId xmlns:p14="http://schemas.microsoft.com/office/powerpoint/2010/main" val="4167259632"/>
+        <p14:creationId xmlns:p14="http://schemas.microsoft.com/office/powerpoint/2010/main" val="1327199227"/>
       </p:ext>
     </p:extLst>
   </p:cSld>
@@ -5383,4 +6117,324 @@
   </a:objectDefaults>
   <a:extraClrSchemeLst/>
 </a:theme>
+</file>
+
+<file path=ppt/theme/theme2.xml><?xml version="1.0" encoding="utf-8"?>
+<a:theme xmlns:a="http://schemas.openxmlformats.org/drawingml/2006/main" name="Office Theme">
+  <a:themeElements>
+    <a:clrScheme name="Office">
+      <a:dk1>
+        <a:sysClr val="windowText" lastClr="000000"/>
+      </a:dk1>
+      <a:lt1>
+        <a:sysClr val="window" lastClr="FFFFFF"/>
+      </a:lt1>
+      <a:dk2>
+        <a:srgbClr val="1F497D"/>
+      </a:dk2>
+      <a:lt2>
+        <a:srgbClr val="EEECE1"/>
+      </a:lt2>
+      <a:accent1>
+        <a:srgbClr val="4F81BD"/>
+      </a:accent1>
+      <a:accent2>
+        <a:srgbClr val="C0504D"/>
+      </a:accent2>
+      <a:accent3>
+        <a:srgbClr val="9BBB59"/>
+      </a:accent3>
+      <a:accent4>
+        <a:srgbClr val="8064A2"/>
+      </a:accent4>
+      <a:accent5>
+        <a:srgbClr val="4BACC6"/>
+      </a:accent5>
+      <a:accent6>
+        <a:srgbClr val="F79646"/>
+      </a:accent6>
+      <a:hlink>
+        <a:srgbClr val="0000FF"/>
+      </a:hlink>
+      <a:folHlink>
+        <a:srgbClr val="800080"/>
+      </a:folHlink>
+    </a:clrScheme>
+    <a:fontScheme name="Office">
+      <a:majorFont>
+        <a:latin typeface="Calibri"/>
+        <a:ea typeface=""/>
+        <a:cs typeface=""/>
+        <a:font script="Jpan" typeface="ＭＳ Ｐゴシック"/>
+        <a:font script="Hang" typeface="맑은 고딕"/>
+        <a:font script="Hans" typeface="宋体"/>
+        <a:font script="Hant" typeface="新細明體"/>
+        <a:font script="Arab" typeface="Times New Roman"/>
+        <a:font script="Hebr" typeface="Times New Roman"/>
+        <a:font script="Thai" typeface="Angsana New"/>
+        <a:font script="Ethi" typeface="Nyala"/>
+        <a:font script="Beng" typeface="Vrinda"/>
+        <a:font script="Gujr" typeface="Shruti"/>
+        <a:font script="Khmr" typeface="MoolBoran"/>
+        <a:font script="Knda" typeface="Tunga"/>
+        <a:font script="Guru" typeface="Raavi"/>
+        <a:font script="Cans" typeface="Euphemia"/>
+        <a:font script="Cher" typeface="Plantagenet Cherokee"/>
+        <a:font script="Yiii" typeface="Microsoft Yi Baiti"/>
+        <a:font script="Tibt" typeface="Microsoft Himalaya"/>
+        <a:font script="Thaa" typeface="MV Boli"/>
+        <a:font script="Deva" typeface="Mangal"/>
+        <a:font script="Telu" typeface="Gautami"/>
+        <a:font script="Taml" typeface="Latha"/>
+        <a:font script="Syrc" typeface="Estrangelo Edessa"/>
+        <a:font script="Orya" typeface="Kalinga"/>
+        <a:font script="Mlym" typeface="Kartika"/>
+        <a:font script="Laoo" typeface="DokChampa"/>
+        <a:font script="Sinh" typeface="Iskoola Pota"/>
+        <a:font script="Mong" typeface="Mongolian Baiti"/>
+        <a:font script="Viet" typeface="Times New Roman"/>
+        <a:font script="Uigh" typeface="Microsoft Uighur"/>
+        <a:font script="Geor" typeface="Sylfaen"/>
+      </a:majorFont>
+      <a:minorFont>
+        <a:latin typeface="Calibri"/>
+        <a:ea typeface=""/>
+        <a:cs typeface=""/>
+        <a:font script="Jpan" typeface="ＭＳ Ｐゴシック"/>
+        <a:font script="Hang" typeface="맑은 고딕"/>
+        <a:font script="Hans" typeface="宋体"/>
+        <a:font script="Hant" typeface="新細明體"/>
+        <a:font script="Arab" typeface="Arial"/>
+        <a:font script="Hebr" typeface="Arial"/>
+        <a:font script="Thai" typeface="Cordia New"/>
+        <a:font script="Ethi" typeface="Nyala"/>
+        <a:font script="Beng" typeface="Vrinda"/>
+        <a:font script="Gujr" typeface="Shruti"/>
+        <a:font script="Khmr" typeface="DaunPenh"/>
+        <a:font script="Knda" typeface="Tunga"/>
+        <a:font script="Guru" typeface="Raavi"/>
+        <a:font script="Cans" typeface="Euphemia"/>
+        <a:font script="Cher" typeface="Plantagenet Cherokee"/>
+        <a:font script="Yiii" typeface="Microsoft Yi Baiti"/>
+        <a:font script="Tibt" typeface="Microsoft Himalaya"/>
+        <a:font script="Thaa" typeface="MV Boli"/>
+        <a:font script="Deva" typeface="Mangal"/>
+        <a:font script="Telu" typeface="Gautami"/>
+        <a:font script="Taml" typeface="Latha"/>
+        <a:font script="Syrc" typeface="Estrangelo Edessa"/>
+        <a:font script="Orya" typeface="Kalinga"/>
+        <a:font script="Mlym" typeface="Kartika"/>
+        <a:font script="Laoo" typeface="DokChampa"/>
+        <a:font script="Sinh" typeface="Iskoola Pota"/>
+        <a:font script="Mong" typeface="Mongolian Baiti"/>
+        <a:font script="Viet" typeface="Arial"/>
+        <a:font script="Uigh" typeface="Microsoft Uighur"/>
+        <a:font script="Geor" typeface="Sylfaen"/>
+      </a:minorFont>
+    </a:fontScheme>
+    <a:fmtScheme name="Office">
+      <a:fillStyleLst>
+        <a:solidFill>
+          <a:schemeClr val="phClr"/>
+        </a:solidFill>
+        <a:gradFill rotWithShape="1">
+          <a:gsLst>
+            <a:gs pos="0">
+              <a:schemeClr val="phClr">
+                <a:tint val="50000"/>
+                <a:satMod val="300000"/>
+              </a:schemeClr>
+            </a:gs>
+            <a:gs pos="35000">
+              <a:schemeClr val="phClr">
+                <a:tint val="37000"/>
+                <a:satMod val="300000"/>
+              </a:schemeClr>
+            </a:gs>
+            <a:gs pos="100000">
+              <a:schemeClr val="phClr">
+                <a:tint val="15000"/>
+                <a:satMod val="350000"/>
+              </a:schemeClr>
+            </a:gs>
+          </a:gsLst>
+          <a:lin ang="16200000" scaled="1"/>
+        </a:gradFill>
+        <a:gradFill rotWithShape="1">
+          <a:gsLst>
+            <a:gs pos="0">
+              <a:schemeClr val="phClr">
+                <a:tint val="100000"/>
+                <a:shade val="100000"/>
+                <a:satMod val="130000"/>
+              </a:schemeClr>
+            </a:gs>
+            <a:gs pos="100000">
+              <a:schemeClr val="phClr">
+                <a:tint val="50000"/>
+                <a:shade val="100000"/>
+                <a:satMod val="350000"/>
+              </a:schemeClr>
+            </a:gs>
+          </a:gsLst>
+          <a:lin ang="16200000" scaled="0"/>
+        </a:gradFill>
+      </a:fillStyleLst>
+      <a:lnStyleLst>
+        <a:ln w="9525" cap="flat" cmpd="sng" algn="ctr">
+          <a:solidFill>
+            <a:schemeClr val="phClr">
+              <a:shade val="95000"/>
+              <a:satMod val="105000"/>
+            </a:schemeClr>
+          </a:solidFill>
+          <a:prstDash val="solid"/>
+        </a:ln>
+        <a:ln w="25400" cap="flat" cmpd="sng" algn="ctr">
+          <a:solidFill>
+            <a:schemeClr val="phClr"/>
+          </a:solidFill>
+          <a:prstDash val="solid"/>
+        </a:ln>
+        <a:ln w="38100" cap="flat" cmpd="sng" algn="ctr">
+          <a:solidFill>
+            <a:schemeClr val="phClr"/>
+          </a:solidFill>
+          <a:prstDash val="solid"/>
+        </a:ln>
+      </a:lnStyleLst>
+      <a:effectStyleLst>
+        <a:effectStyle>
+          <a:effectLst>
+            <a:outerShdw blurRad="40000" dist="20000" dir="5400000" rotWithShape="0">
+              <a:srgbClr val="000000">
+                <a:alpha val="38000"/>
+              </a:srgbClr>
+            </a:outerShdw>
+          </a:effectLst>
+        </a:effectStyle>
+        <a:effectStyle>
+          <a:effectLst>
+            <a:outerShdw blurRad="40000" dist="23000" dir="5400000" rotWithShape="0">
+              <a:srgbClr val="000000">
+                <a:alpha val="35000"/>
+              </a:srgbClr>
+            </a:outerShdw>
+          </a:effectLst>
+        </a:effectStyle>
+        <a:effectStyle>
+          <a:effectLst>
+            <a:outerShdw blurRad="40000" dist="23000" dir="5400000" rotWithShape="0">
+              <a:srgbClr val="000000">
+                <a:alpha val="35000"/>
+              </a:srgbClr>
+            </a:outerShdw>
+          </a:effectLst>
+          <a:scene3d>
+            <a:camera prst="orthographicFront">
+              <a:rot lat="0" lon="0" rev="0"/>
+            </a:camera>
+            <a:lightRig rig="threePt" dir="t">
+              <a:rot lat="0" lon="0" rev="1200000"/>
+            </a:lightRig>
+          </a:scene3d>
+          <a:sp3d>
+            <a:bevelT w="63500" h="25400"/>
+          </a:sp3d>
+        </a:effectStyle>
+      </a:effectStyleLst>
+      <a:bgFillStyleLst>
+        <a:solidFill>
+          <a:schemeClr val="phClr"/>
+        </a:solidFill>
+        <a:gradFill rotWithShape="1">
+          <a:gsLst>
+            <a:gs pos="0">
+              <a:schemeClr val="phClr">
+                <a:tint val="40000"/>
+                <a:satMod val="350000"/>
+              </a:schemeClr>
+            </a:gs>
+            <a:gs pos="40000">
+              <a:schemeClr val="phClr">
+                <a:tint val="45000"/>
+                <a:shade val="99000"/>
+                <a:satMod val="350000"/>
+              </a:schemeClr>
+            </a:gs>
+            <a:gs pos="100000">
+              <a:schemeClr val="phClr">
+                <a:shade val="20000"/>
+                <a:satMod val="255000"/>
+              </a:schemeClr>
+            </a:gs>
+          </a:gsLst>
+          <a:path path="circle">
+            <a:fillToRect l="50000" t="-80000" r="50000" b="180000"/>
+          </a:path>
+        </a:gradFill>
+        <a:gradFill rotWithShape="1">
+          <a:gsLst>
+            <a:gs pos="0">
+              <a:schemeClr val="phClr">
+                <a:tint val="80000"/>
+                <a:satMod val="300000"/>
+              </a:schemeClr>
+            </a:gs>
+            <a:gs pos="100000">
+              <a:schemeClr val="phClr">
+                <a:shade val="30000"/>
+                <a:satMod val="200000"/>
+              </a:schemeClr>
+            </a:gs>
+          </a:gsLst>
+          <a:path path="circle">
+            <a:fillToRect l="50000" t="50000" r="50000" b="50000"/>
+          </a:path>
+        </a:gradFill>
+      </a:bgFillStyleLst>
+    </a:fmtScheme>
+  </a:themeElements>
+  <a:objectDefaults>
+    <a:spDef>
+      <a:spPr/>
+      <a:bodyPr/>
+      <a:lstStyle/>
+      <a:style>
+        <a:lnRef idx="1">
+          <a:schemeClr val="accent1"/>
+        </a:lnRef>
+        <a:fillRef idx="3">
+          <a:schemeClr val="accent1"/>
+        </a:fillRef>
+        <a:effectRef idx="2">
+          <a:schemeClr val="accent1"/>
+        </a:effectRef>
+        <a:fontRef idx="minor">
+          <a:schemeClr val="lt1"/>
+        </a:fontRef>
+      </a:style>
+    </a:spDef>
+    <a:lnDef>
+      <a:spPr/>
+      <a:bodyPr/>
+      <a:lstStyle/>
+      <a:style>
+        <a:lnRef idx="2">
+          <a:schemeClr val="accent1"/>
+        </a:lnRef>
+        <a:fillRef idx="0">
+          <a:schemeClr val="accent1"/>
+        </a:fillRef>
+        <a:effectRef idx="1">
+          <a:schemeClr val="accent1"/>
+        </a:effectRef>
+        <a:fontRef idx="minor">
+          <a:schemeClr val="tx1"/>
+        </a:fontRef>
+      </a:style>
+    </a:lnDef>
+  </a:objectDefaults>
+  <a:extraClrSchemeLst/>
+</a:theme>
 </file>
</xml_diff>